<commit_message>
plotting pretty presentation graphs
</commit_message>
<xml_diff>
--- a/Presentation/slide_deck.pptx
+++ b/Presentation/slide_deck.pptx
@@ -5,14 +5,18 @@
     <p:sldMasterId id="2147483648" r:id="rId1"/>
   </p:sldMasterIdLst>
   <p:notesMasterIdLst>
-    <p:notesMasterId r:id="rId7"/>
+    <p:notesMasterId r:id="rId11"/>
   </p:notesMasterIdLst>
   <p:sldIdLst>
     <p:sldId id="256" r:id="rId2"/>
     <p:sldId id="260" r:id="rId3"/>
-    <p:sldId id="262" r:id="rId4"/>
-    <p:sldId id="261" r:id="rId5"/>
-    <p:sldId id="259" r:id="rId6"/>
+    <p:sldId id="259" r:id="rId4"/>
+    <p:sldId id="264" r:id="rId5"/>
+    <p:sldId id="265" r:id="rId6"/>
+    <p:sldId id="263" r:id="rId7"/>
+    <p:sldId id="262" r:id="rId8"/>
+    <p:sldId id="261" r:id="rId9"/>
+    <p:sldId id="266" r:id="rId10"/>
   </p:sldIdLst>
   <p:sldSz cx="12192000" cy="6858000"/>
   <p:notesSz cx="6858000" cy="9144000"/>
@@ -4373,6 +4377,1348 @@
 </file>
 
 <file path=ppt/slides/slide3.xml><?xml version="1.0" encoding="utf-8"?>
+<p:sld xmlns:a="http://schemas.openxmlformats.org/drawingml/2006/main" xmlns:r="http://schemas.openxmlformats.org/officeDocument/2006/relationships" xmlns:p="http://schemas.openxmlformats.org/presentationml/2006/main">
+  <p:cSld>
+    <p:spTree>
+      <p:nvGrpSpPr>
+        <p:cNvPr id="1" name=""/>
+        <p:cNvGrpSpPr/>
+        <p:nvPr/>
+      </p:nvGrpSpPr>
+      <p:grpSpPr>
+        <a:xfrm>
+          <a:off x="0" y="0"/>
+          <a:ext cx="0" cy="0"/>
+          <a:chOff x="0" y="0"/>
+          <a:chExt cx="0" cy="0"/>
+        </a:xfrm>
+      </p:grpSpPr>
+      <p:sp>
+        <p:nvSpPr>
+          <p:cNvPr id="2" name="Slide Number Placeholder 1">
+            <a:extLst>
+              <a:ext uri="{FF2B5EF4-FFF2-40B4-BE49-F238E27FC236}">
+                <a16:creationId xmlns:a16="http://schemas.microsoft.com/office/drawing/2014/main" id="{9B12371F-989E-EE43-B20F-90E48B433F0A}"/>
+              </a:ext>
+            </a:extLst>
+          </p:cNvPr>
+          <p:cNvSpPr>
+            <a:spLocks noGrp="1"/>
+          </p:cNvSpPr>
+          <p:nvPr>
+            <p:ph type="sldNum" sz="quarter" idx="12"/>
+          </p:nvPr>
+        </p:nvSpPr>
+        <p:spPr/>
+        <p:txBody>
+          <a:bodyPr/>
+          <a:lstStyle/>
+          <a:p>
+            <a:fld id="{2D00CA07-45C7-8142-9F4D-3A07AD48DFA1}" type="slidenum">
+              <a:rPr lang="en-US" smtClean="0"/>
+              <a:t>3</a:t>
+            </a:fld>
+            <a:endParaRPr lang="en-US"/>
+          </a:p>
+        </p:txBody>
+      </p:sp>
+      <p:sp>
+        <p:nvSpPr>
+          <p:cNvPr id="3" name="TextBox 2">
+            <a:extLst>
+              <a:ext uri="{FF2B5EF4-FFF2-40B4-BE49-F238E27FC236}">
+                <a16:creationId xmlns:a16="http://schemas.microsoft.com/office/drawing/2014/main" id="{2B4E9B55-4425-2740-A108-76FF69BA3D12}"/>
+              </a:ext>
+            </a:extLst>
+          </p:cNvPr>
+          <p:cNvSpPr txBox="1"/>
+          <p:nvPr/>
+        </p:nvSpPr>
+        <p:spPr>
+          <a:xfrm>
+            <a:off x="460713" y="332656"/>
+            <a:ext cx="3949799" cy="553998"/>
+          </a:xfrm>
+          <a:prstGeom prst="rect">
+            <a:avLst/>
+          </a:prstGeom>
+          <a:noFill/>
+        </p:spPr>
+        <p:txBody>
+          <a:bodyPr wrap="none" lIns="0" tIns="0" rIns="0" bIns="0" rtlCol="0">
+            <a:spAutoFit/>
+          </a:bodyPr>
+          <a:lstStyle/>
+          <a:p>
+            <a:r>
+              <a:rPr lang="en-US" sz="3600" b="1" dirty="0">
+                <a:latin typeface="Arial" panose="020B0604020202020204" pitchFamily="34" charset="0"/>
+                <a:cs typeface="Arial" panose="020B0604020202020204" pitchFamily="34" charset="0"/>
+              </a:rPr>
+              <a:t>Modeling Process</a:t>
+            </a:r>
+          </a:p>
+        </p:txBody>
+      </p:sp>
+      <p:cxnSp>
+        <p:nvCxnSpPr>
+          <p:cNvPr id="4" name="Straight Connector 3">
+            <a:extLst>
+              <a:ext uri="{FF2B5EF4-FFF2-40B4-BE49-F238E27FC236}">
+                <a16:creationId xmlns:a16="http://schemas.microsoft.com/office/drawing/2014/main" id="{CFDF23E1-C7BD-4C48-9E8A-53704A4D662C}"/>
+              </a:ext>
+            </a:extLst>
+          </p:cNvPr>
+          <p:cNvCxnSpPr>
+            <a:cxnSpLocks/>
+          </p:cNvCxnSpPr>
+          <p:nvPr/>
+        </p:nvCxnSpPr>
+        <p:spPr>
+          <a:xfrm>
+            <a:off x="460714" y="886654"/>
+            <a:ext cx="11270573" cy="0"/>
+          </a:xfrm>
+          <a:prstGeom prst="line">
+            <a:avLst/>
+          </a:prstGeom>
+          <a:ln w="38100">
+            <a:solidFill>
+              <a:schemeClr val="tx1"/>
+            </a:solidFill>
+          </a:ln>
+        </p:spPr>
+        <p:style>
+          <a:lnRef idx="1">
+            <a:schemeClr val="accent1"/>
+          </a:lnRef>
+          <a:fillRef idx="0">
+            <a:schemeClr val="accent1"/>
+          </a:fillRef>
+          <a:effectRef idx="0">
+            <a:schemeClr val="accent1"/>
+          </a:effectRef>
+          <a:fontRef idx="minor">
+            <a:schemeClr val="tx1"/>
+          </a:fontRef>
+        </p:style>
+      </p:cxnSp>
+      <p:sp>
+        <p:nvSpPr>
+          <p:cNvPr id="5" name="Rectangle 4">
+            <a:extLst>
+              <a:ext uri="{FF2B5EF4-FFF2-40B4-BE49-F238E27FC236}">
+                <a16:creationId xmlns:a16="http://schemas.microsoft.com/office/drawing/2014/main" id="{51A6D943-D3C6-704C-B71D-862CD909B942}"/>
+              </a:ext>
+            </a:extLst>
+          </p:cNvPr>
+          <p:cNvSpPr/>
+          <p:nvPr/>
+        </p:nvSpPr>
+        <p:spPr>
+          <a:xfrm>
+            <a:off x="443945" y="2996960"/>
+            <a:ext cx="1242799" cy="864080"/>
+          </a:xfrm>
+          <a:prstGeom prst="rect">
+            <a:avLst/>
+          </a:prstGeom>
+          <a:solidFill>
+            <a:schemeClr val="bg1">
+              <a:lumMod val="95000"/>
+            </a:schemeClr>
+          </a:solidFill>
+          <a:ln w="28575">
+            <a:solidFill>
+              <a:schemeClr val="tx1"/>
+            </a:solidFill>
+          </a:ln>
+        </p:spPr>
+        <p:style>
+          <a:lnRef idx="2">
+            <a:schemeClr val="accent1">
+              <a:shade val="50000"/>
+            </a:schemeClr>
+          </a:lnRef>
+          <a:fillRef idx="1">
+            <a:schemeClr val="accent1"/>
+          </a:fillRef>
+          <a:effectRef idx="0">
+            <a:schemeClr val="accent1"/>
+          </a:effectRef>
+          <a:fontRef idx="minor">
+            <a:schemeClr val="lt1"/>
+          </a:fontRef>
+        </p:style>
+        <p:txBody>
+          <a:bodyPr rtlCol="0" anchor="ctr"/>
+          <a:lstStyle/>
+          <a:p>
+            <a:pPr algn="ctr"/>
+            <a:r>
+              <a:rPr lang="en-US" sz="2400" dirty="0">
+                <a:solidFill>
+                  <a:schemeClr val="tx1"/>
+                </a:solidFill>
+                <a:latin typeface="Arial" panose="020B0604020202020204" pitchFamily="34" charset="0"/>
+                <a:cs typeface="Arial" panose="020B0604020202020204" pitchFamily="34" charset="0"/>
+              </a:rPr>
+              <a:t>EDA</a:t>
+            </a:r>
+          </a:p>
+        </p:txBody>
+      </p:sp>
+      <p:sp>
+        <p:nvSpPr>
+          <p:cNvPr id="9" name="Rectangle 8">
+            <a:extLst>
+              <a:ext uri="{FF2B5EF4-FFF2-40B4-BE49-F238E27FC236}">
+                <a16:creationId xmlns:a16="http://schemas.microsoft.com/office/drawing/2014/main" id="{AF3BB73F-EDA3-524A-9402-C0B173CBC247}"/>
+              </a:ext>
+            </a:extLst>
+          </p:cNvPr>
+          <p:cNvSpPr/>
+          <p:nvPr/>
+        </p:nvSpPr>
+        <p:spPr>
+          <a:xfrm>
+            <a:off x="2285476" y="2996960"/>
+            <a:ext cx="1944216" cy="864080"/>
+          </a:xfrm>
+          <a:prstGeom prst="rect">
+            <a:avLst/>
+          </a:prstGeom>
+          <a:solidFill>
+            <a:schemeClr val="bg1">
+              <a:lumMod val="95000"/>
+            </a:schemeClr>
+          </a:solidFill>
+          <a:ln w="28575">
+            <a:solidFill>
+              <a:schemeClr val="tx1"/>
+            </a:solidFill>
+          </a:ln>
+        </p:spPr>
+        <p:style>
+          <a:lnRef idx="2">
+            <a:schemeClr val="accent1">
+              <a:shade val="50000"/>
+            </a:schemeClr>
+          </a:lnRef>
+          <a:fillRef idx="1">
+            <a:schemeClr val="accent1"/>
+          </a:fillRef>
+          <a:effectRef idx="0">
+            <a:schemeClr val="accent1"/>
+          </a:effectRef>
+          <a:fontRef idx="minor">
+            <a:schemeClr val="lt1"/>
+          </a:fontRef>
+        </p:style>
+        <p:txBody>
+          <a:bodyPr rtlCol="0" anchor="ctr"/>
+          <a:lstStyle/>
+          <a:p>
+            <a:pPr algn="ctr"/>
+            <a:r>
+              <a:rPr lang="en-US" sz="2400" dirty="0">
+                <a:solidFill>
+                  <a:schemeClr val="tx1"/>
+                </a:solidFill>
+                <a:latin typeface="Arial" panose="020B0604020202020204" pitchFamily="34" charset="0"/>
+                <a:cs typeface="Arial" panose="020B0604020202020204" pitchFamily="34" charset="0"/>
+              </a:rPr>
+              <a:t>Experiments</a:t>
+            </a:r>
+          </a:p>
+        </p:txBody>
+      </p:sp>
+      <p:cxnSp>
+        <p:nvCxnSpPr>
+          <p:cNvPr id="11" name="Straight Arrow Connector 10">
+            <a:extLst>
+              <a:ext uri="{FF2B5EF4-FFF2-40B4-BE49-F238E27FC236}">
+                <a16:creationId xmlns:a16="http://schemas.microsoft.com/office/drawing/2014/main" id="{4B903348-6DD5-D545-8CB0-2C0E22A9049A}"/>
+              </a:ext>
+            </a:extLst>
+          </p:cNvPr>
+          <p:cNvCxnSpPr>
+            <a:cxnSpLocks/>
+          </p:cNvCxnSpPr>
+          <p:nvPr/>
+        </p:nvCxnSpPr>
+        <p:spPr>
+          <a:xfrm>
+            <a:off x="1686744" y="3429000"/>
+            <a:ext cx="598732" cy="0"/>
+          </a:xfrm>
+          <a:prstGeom prst="straightConnector1">
+            <a:avLst/>
+          </a:prstGeom>
+          <a:ln w="57150">
+            <a:solidFill>
+              <a:schemeClr val="tx1"/>
+            </a:solidFill>
+            <a:tailEnd type="triangle"/>
+          </a:ln>
+        </p:spPr>
+        <p:style>
+          <a:lnRef idx="1">
+            <a:schemeClr val="accent1"/>
+          </a:lnRef>
+          <a:fillRef idx="0">
+            <a:schemeClr val="accent1"/>
+          </a:fillRef>
+          <a:effectRef idx="0">
+            <a:schemeClr val="accent1"/>
+          </a:effectRef>
+          <a:fontRef idx="minor">
+            <a:schemeClr val="tx1"/>
+          </a:fontRef>
+        </p:style>
+      </p:cxnSp>
+      <p:sp>
+        <p:nvSpPr>
+          <p:cNvPr id="14" name="Rectangle 13">
+            <a:extLst>
+              <a:ext uri="{FF2B5EF4-FFF2-40B4-BE49-F238E27FC236}">
+                <a16:creationId xmlns:a16="http://schemas.microsoft.com/office/drawing/2014/main" id="{B5B08CAE-0FBB-6D44-BBF0-75F8C5CB7CD8}"/>
+              </a:ext>
+            </a:extLst>
+          </p:cNvPr>
+          <p:cNvSpPr/>
+          <p:nvPr/>
+        </p:nvSpPr>
+        <p:spPr>
+          <a:xfrm>
+            <a:off x="4828424" y="2996960"/>
+            <a:ext cx="1944216" cy="864080"/>
+          </a:xfrm>
+          <a:prstGeom prst="rect">
+            <a:avLst/>
+          </a:prstGeom>
+          <a:solidFill>
+            <a:schemeClr val="bg1">
+              <a:lumMod val="95000"/>
+            </a:schemeClr>
+          </a:solidFill>
+          <a:ln w="28575">
+            <a:solidFill>
+              <a:schemeClr val="tx1"/>
+            </a:solidFill>
+          </a:ln>
+        </p:spPr>
+        <p:style>
+          <a:lnRef idx="2">
+            <a:schemeClr val="accent1">
+              <a:shade val="50000"/>
+            </a:schemeClr>
+          </a:lnRef>
+          <a:fillRef idx="1">
+            <a:schemeClr val="accent1"/>
+          </a:fillRef>
+          <a:effectRef idx="0">
+            <a:schemeClr val="accent1"/>
+          </a:effectRef>
+          <a:fontRef idx="minor">
+            <a:schemeClr val="lt1"/>
+          </a:fontRef>
+        </p:style>
+        <p:txBody>
+          <a:bodyPr rtlCol="0" anchor="ctr"/>
+          <a:lstStyle/>
+          <a:p>
+            <a:pPr algn="ctr"/>
+            <a:r>
+              <a:rPr lang="en-US" sz="2400" dirty="0">
+                <a:solidFill>
+                  <a:schemeClr val="tx1"/>
+                </a:solidFill>
+                <a:latin typeface="Arial" panose="020B0604020202020204" pitchFamily="34" charset="0"/>
+                <a:cs typeface="Arial" panose="020B0604020202020204" pitchFamily="34" charset="0"/>
+              </a:rPr>
+              <a:t>Stepwise Regression</a:t>
+            </a:r>
+          </a:p>
+        </p:txBody>
+      </p:sp>
+      <p:sp>
+        <p:nvSpPr>
+          <p:cNvPr id="17" name="Rectangle 16">
+            <a:extLst>
+              <a:ext uri="{FF2B5EF4-FFF2-40B4-BE49-F238E27FC236}">
+                <a16:creationId xmlns:a16="http://schemas.microsoft.com/office/drawing/2014/main" id="{67958A4B-3DF5-8644-8862-76793BED6B1B}"/>
+              </a:ext>
+            </a:extLst>
+          </p:cNvPr>
+          <p:cNvSpPr/>
+          <p:nvPr/>
+        </p:nvSpPr>
+        <p:spPr>
+          <a:xfrm>
+            <a:off x="7371372" y="2996960"/>
+            <a:ext cx="1800200" cy="864080"/>
+          </a:xfrm>
+          <a:prstGeom prst="rect">
+            <a:avLst/>
+          </a:prstGeom>
+          <a:solidFill>
+            <a:schemeClr val="bg1">
+              <a:lumMod val="95000"/>
+            </a:schemeClr>
+          </a:solidFill>
+          <a:ln w="28575">
+            <a:solidFill>
+              <a:schemeClr val="tx1"/>
+            </a:solidFill>
+          </a:ln>
+        </p:spPr>
+        <p:style>
+          <a:lnRef idx="2">
+            <a:schemeClr val="accent1">
+              <a:shade val="50000"/>
+            </a:schemeClr>
+          </a:lnRef>
+          <a:fillRef idx="1">
+            <a:schemeClr val="accent1"/>
+          </a:fillRef>
+          <a:effectRef idx="0">
+            <a:schemeClr val="accent1"/>
+          </a:effectRef>
+          <a:fontRef idx="minor">
+            <a:schemeClr val="lt1"/>
+          </a:fontRef>
+        </p:style>
+        <p:txBody>
+          <a:bodyPr rtlCol="0" anchor="ctr"/>
+          <a:lstStyle/>
+          <a:p>
+            <a:pPr algn="ctr"/>
+            <a:r>
+              <a:rPr lang="en-US" sz="2400" dirty="0">
+                <a:solidFill>
+                  <a:schemeClr val="tx1"/>
+                </a:solidFill>
+                <a:latin typeface="Arial" panose="020B0604020202020204" pitchFamily="34" charset="0"/>
+                <a:cs typeface="Arial" panose="020B0604020202020204" pitchFamily="34" charset="0"/>
+              </a:rPr>
+              <a:t>Testing Interactions</a:t>
+            </a:r>
+          </a:p>
+        </p:txBody>
+      </p:sp>
+      <p:sp>
+        <p:nvSpPr>
+          <p:cNvPr id="21" name="Rectangle 20">
+            <a:extLst>
+              <a:ext uri="{FF2B5EF4-FFF2-40B4-BE49-F238E27FC236}">
+                <a16:creationId xmlns:a16="http://schemas.microsoft.com/office/drawing/2014/main" id="{A19A4E76-2EE5-DB46-8046-D224EF877A7B}"/>
+              </a:ext>
+            </a:extLst>
+          </p:cNvPr>
+          <p:cNvSpPr/>
+          <p:nvPr/>
+        </p:nvSpPr>
+        <p:spPr>
+          <a:xfrm>
+            <a:off x="9770303" y="2996960"/>
+            <a:ext cx="1944216" cy="864080"/>
+          </a:xfrm>
+          <a:prstGeom prst="rect">
+            <a:avLst/>
+          </a:prstGeom>
+          <a:solidFill>
+            <a:schemeClr val="bg1">
+              <a:lumMod val="95000"/>
+            </a:schemeClr>
+          </a:solidFill>
+          <a:ln w="28575">
+            <a:solidFill>
+              <a:schemeClr val="tx1"/>
+            </a:solidFill>
+          </a:ln>
+        </p:spPr>
+        <p:style>
+          <a:lnRef idx="2">
+            <a:schemeClr val="accent1">
+              <a:shade val="50000"/>
+            </a:schemeClr>
+          </a:lnRef>
+          <a:fillRef idx="1">
+            <a:schemeClr val="accent1"/>
+          </a:fillRef>
+          <a:effectRef idx="0">
+            <a:schemeClr val="accent1"/>
+          </a:effectRef>
+          <a:fontRef idx="minor">
+            <a:schemeClr val="lt1"/>
+          </a:fontRef>
+        </p:style>
+        <p:txBody>
+          <a:bodyPr rtlCol="0" anchor="ctr"/>
+          <a:lstStyle/>
+          <a:p>
+            <a:pPr algn="ctr"/>
+            <a:r>
+              <a:rPr lang="en-US" sz="2400" dirty="0">
+                <a:solidFill>
+                  <a:schemeClr val="tx1"/>
+                </a:solidFill>
+                <a:latin typeface="Arial" panose="020B0604020202020204" pitchFamily="34" charset="0"/>
+                <a:cs typeface="Arial" panose="020B0604020202020204" pitchFamily="34" charset="0"/>
+              </a:rPr>
+              <a:t>Model Assessment</a:t>
+            </a:r>
+          </a:p>
+        </p:txBody>
+      </p:sp>
+      <p:cxnSp>
+        <p:nvCxnSpPr>
+          <p:cNvPr id="26" name="Straight Arrow Connector 25">
+            <a:extLst>
+              <a:ext uri="{FF2B5EF4-FFF2-40B4-BE49-F238E27FC236}">
+                <a16:creationId xmlns:a16="http://schemas.microsoft.com/office/drawing/2014/main" id="{6FCAC956-B87F-CE4D-9A15-03E102B15299}"/>
+              </a:ext>
+            </a:extLst>
+          </p:cNvPr>
+          <p:cNvCxnSpPr>
+            <a:cxnSpLocks/>
+          </p:cNvCxnSpPr>
+          <p:nvPr/>
+        </p:nvCxnSpPr>
+        <p:spPr>
+          <a:xfrm>
+            <a:off x="4229692" y="3429000"/>
+            <a:ext cx="598732" cy="0"/>
+          </a:xfrm>
+          <a:prstGeom prst="straightConnector1">
+            <a:avLst/>
+          </a:prstGeom>
+          <a:ln w="57150">
+            <a:solidFill>
+              <a:schemeClr val="tx1"/>
+            </a:solidFill>
+            <a:tailEnd type="triangle"/>
+          </a:ln>
+        </p:spPr>
+        <p:style>
+          <a:lnRef idx="1">
+            <a:schemeClr val="accent1"/>
+          </a:lnRef>
+          <a:fillRef idx="0">
+            <a:schemeClr val="accent1"/>
+          </a:fillRef>
+          <a:effectRef idx="0">
+            <a:schemeClr val="accent1"/>
+          </a:effectRef>
+          <a:fontRef idx="minor">
+            <a:schemeClr val="tx1"/>
+          </a:fontRef>
+        </p:style>
+      </p:cxnSp>
+      <p:cxnSp>
+        <p:nvCxnSpPr>
+          <p:cNvPr id="27" name="Straight Arrow Connector 26">
+            <a:extLst>
+              <a:ext uri="{FF2B5EF4-FFF2-40B4-BE49-F238E27FC236}">
+                <a16:creationId xmlns:a16="http://schemas.microsoft.com/office/drawing/2014/main" id="{8B7CFED4-BB38-704C-B0A5-095B44255B60}"/>
+              </a:ext>
+            </a:extLst>
+          </p:cNvPr>
+          <p:cNvCxnSpPr>
+            <a:cxnSpLocks/>
+          </p:cNvCxnSpPr>
+          <p:nvPr/>
+        </p:nvCxnSpPr>
+        <p:spPr>
+          <a:xfrm>
+            <a:off x="6772640" y="3429000"/>
+            <a:ext cx="598732" cy="0"/>
+          </a:xfrm>
+          <a:prstGeom prst="straightConnector1">
+            <a:avLst/>
+          </a:prstGeom>
+          <a:ln w="57150">
+            <a:solidFill>
+              <a:schemeClr val="tx1"/>
+            </a:solidFill>
+            <a:tailEnd type="triangle"/>
+          </a:ln>
+        </p:spPr>
+        <p:style>
+          <a:lnRef idx="1">
+            <a:schemeClr val="accent1"/>
+          </a:lnRef>
+          <a:fillRef idx="0">
+            <a:schemeClr val="accent1"/>
+          </a:fillRef>
+          <a:effectRef idx="0">
+            <a:schemeClr val="accent1"/>
+          </a:effectRef>
+          <a:fontRef idx="minor">
+            <a:schemeClr val="tx1"/>
+          </a:fontRef>
+        </p:style>
+      </p:cxnSp>
+      <p:cxnSp>
+        <p:nvCxnSpPr>
+          <p:cNvPr id="28" name="Straight Arrow Connector 27">
+            <a:extLst>
+              <a:ext uri="{FF2B5EF4-FFF2-40B4-BE49-F238E27FC236}">
+                <a16:creationId xmlns:a16="http://schemas.microsoft.com/office/drawing/2014/main" id="{A2AE797E-8991-A946-BE59-37E1E1DE5291}"/>
+              </a:ext>
+            </a:extLst>
+          </p:cNvPr>
+          <p:cNvCxnSpPr>
+            <a:cxnSpLocks/>
+          </p:cNvCxnSpPr>
+          <p:nvPr/>
+        </p:nvCxnSpPr>
+        <p:spPr>
+          <a:xfrm>
+            <a:off x="9171572" y="3429000"/>
+            <a:ext cx="598732" cy="0"/>
+          </a:xfrm>
+          <a:prstGeom prst="straightConnector1">
+            <a:avLst/>
+          </a:prstGeom>
+          <a:ln w="57150">
+            <a:solidFill>
+              <a:schemeClr val="tx1"/>
+            </a:solidFill>
+            <a:tailEnd type="triangle"/>
+          </a:ln>
+        </p:spPr>
+        <p:style>
+          <a:lnRef idx="1">
+            <a:schemeClr val="accent1"/>
+          </a:lnRef>
+          <a:fillRef idx="0">
+            <a:schemeClr val="accent1"/>
+          </a:fillRef>
+          <a:effectRef idx="0">
+            <a:schemeClr val="accent1"/>
+          </a:effectRef>
+          <a:fontRef idx="minor">
+            <a:schemeClr val="tx1"/>
+          </a:fontRef>
+        </p:style>
+      </p:cxnSp>
+    </p:spTree>
+    <p:extLst>
+      <p:ext uri="{BB962C8B-B14F-4D97-AF65-F5344CB8AC3E}">
+        <p14:creationId xmlns:p14="http://schemas.microsoft.com/office/powerpoint/2010/main" val="1887103581"/>
+      </p:ext>
+    </p:extLst>
+  </p:cSld>
+  <p:clrMapOvr>
+    <a:masterClrMapping/>
+  </p:clrMapOvr>
+</p:sld>
+</file>
+
+<file path=ppt/slides/slide4.xml><?xml version="1.0" encoding="utf-8"?>
+<p:sld xmlns:a="http://schemas.openxmlformats.org/drawingml/2006/main" xmlns:r="http://schemas.openxmlformats.org/officeDocument/2006/relationships" xmlns:p="http://schemas.openxmlformats.org/presentationml/2006/main">
+  <p:cSld>
+    <p:spTree>
+      <p:nvGrpSpPr>
+        <p:cNvPr id="1" name=""/>
+        <p:cNvGrpSpPr/>
+        <p:nvPr/>
+      </p:nvGrpSpPr>
+      <p:grpSpPr>
+        <a:xfrm>
+          <a:off x="0" y="0"/>
+          <a:ext cx="0" cy="0"/>
+          <a:chOff x="0" y="0"/>
+          <a:chExt cx="0" cy="0"/>
+        </a:xfrm>
+      </p:grpSpPr>
+      <p:sp>
+        <p:nvSpPr>
+          <p:cNvPr id="17" name="Rectangle 16">
+            <a:extLst>
+              <a:ext uri="{FF2B5EF4-FFF2-40B4-BE49-F238E27FC236}">
+                <a16:creationId xmlns:a16="http://schemas.microsoft.com/office/drawing/2014/main" id="{14142523-B9D3-A349-BCDE-3FFBC2A198DE}"/>
+              </a:ext>
+            </a:extLst>
+          </p:cNvPr>
+          <p:cNvSpPr/>
+          <p:nvPr/>
+        </p:nvSpPr>
+        <p:spPr>
+          <a:xfrm>
+            <a:off x="246887" y="6023447"/>
+            <a:ext cx="1188452" cy="497233"/>
+          </a:xfrm>
+          <a:prstGeom prst="rect">
+            <a:avLst/>
+          </a:prstGeom>
+          <a:solidFill>
+            <a:schemeClr val="bg1"/>
+          </a:solidFill>
+          <a:ln>
+            <a:noFill/>
+          </a:ln>
+        </p:spPr>
+        <p:style>
+          <a:lnRef idx="2">
+            <a:schemeClr val="accent1">
+              <a:shade val="50000"/>
+            </a:schemeClr>
+          </a:lnRef>
+          <a:fillRef idx="1">
+            <a:schemeClr val="accent1"/>
+          </a:fillRef>
+          <a:effectRef idx="0">
+            <a:schemeClr val="accent1"/>
+          </a:effectRef>
+          <a:fontRef idx="minor">
+            <a:schemeClr val="lt1"/>
+          </a:fontRef>
+        </p:style>
+        <p:txBody>
+          <a:bodyPr rtlCol="0" anchor="ctr"/>
+          <a:lstStyle/>
+          <a:p>
+            <a:pPr algn="ctr"/>
+            <a:endParaRPr lang="en-US" dirty="0"/>
+          </a:p>
+        </p:txBody>
+      </p:sp>
+      <p:sp>
+        <p:nvSpPr>
+          <p:cNvPr id="2" name="Slide Number Placeholder 1">
+            <a:extLst>
+              <a:ext uri="{FF2B5EF4-FFF2-40B4-BE49-F238E27FC236}">
+                <a16:creationId xmlns:a16="http://schemas.microsoft.com/office/drawing/2014/main" id="{9B12371F-989E-EE43-B20F-90E48B433F0A}"/>
+              </a:ext>
+            </a:extLst>
+          </p:cNvPr>
+          <p:cNvSpPr>
+            <a:spLocks noGrp="1"/>
+          </p:cNvSpPr>
+          <p:nvPr>
+            <p:ph type="sldNum" sz="quarter" idx="12"/>
+          </p:nvPr>
+        </p:nvSpPr>
+        <p:spPr/>
+        <p:txBody>
+          <a:bodyPr/>
+          <a:lstStyle/>
+          <a:p>
+            <a:fld id="{2D00CA07-45C7-8142-9F4D-3A07AD48DFA1}" type="slidenum">
+              <a:rPr lang="en-US" smtClean="0"/>
+              <a:t>4</a:t>
+            </a:fld>
+            <a:endParaRPr lang="en-US"/>
+          </a:p>
+        </p:txBody>
+      </p:sp>
+      <p:sp>
+        <p:nvSpPr>
+          <p:cNvPr id="3" name="TextBox 2">
+            <a:extLst>
+              <a:ext uri="{FF2B5EF4-FFF2-40B4-BE49-F238E27FC236}">
+                <a16:creationId xmlns:a16="http://schemas.microsoft.com/office/drawing/2014/main" id="{2B4E9B55-4425-2740-A108-76FF69BA3D12}"/>
+              </a:ext>
+            </a:extLst>
+          </p:cNvPr>
+          <p:cNvSpPr txBox="1"/>
+          <p:nvPr/>
+        </p:nvSpPr>
+        <p:spPr>
+          <a:xfrm>
+            <a:off x="460713" y="332656"/>
+            <a:ext cx="974626" cy="553998"/>
+          </a:xfrm>
+          <a:prstGeom prst="rect">
+            <a:avLst/>
+          </a:prstGeom>
+          <a:noFill/>
+        </p:spPr>
+        <p:txBody>
+          <a:bodyPr wrap="none" lIns="0" tIns="0" rIns="0" bIns="0" rtlCol="0">
+            <a:spAutoFit/>
+          </a:bodyPr>
+          <a:lstStyle/>
+          <a:p>
+            <a:r>
+              <a:rPr lang="en-US" sz="3600" b="1" dirty="0">
+                <a:latin typeface="Arial" panose="020B0604020202020204" pitchFamily="34" charset="0"/>
+                <a:cs typeface="Arial" panose="020B0604020202020204" pitchFamily="34" charset="0"/>
+              </a:rPr>
+              <a:t>EDA</a:t>
+            </a:r>
+          </a:p>
+        </p:txBody>
+      </p:sp>
+      <p:cxnSp>
+        <p:nvCxnSpPr>
+          <p:cNvPr id="4" name="Straight Connector 3">
+            <a:extLst>
+              <a:ext uri="{FF2B5EF4-FFF2-40B4-BE49-F238E27FC236}">
+                <a16:creationId xmlns:a16="http://schemas.microsoft.com/office/drawing/2014/main" id="{CFDF23E1-C7BD-4C48-9E8A-53704A4D662C}"/>
+              </a:ext>
+            </a:extLst>
+          </p:cNvPr>
+          <p:cNvCxnSpPr>
+            <a:cxnSpLocks/>
+          </p:cNvCxnSpPr>
+          <p:nvPr/>
+        </p:nvCxnSpPr>
+        <p:spPr>
+          <a:xfrm>
+            <a:off x="460714" y="886654"/>
+            <a:ext cx="11270573" cy="0"/>
+          </a:xfrm>
+          <a:prstGeom prst="line">
+            <a:avLst/>
+          </a:prstGeom>
+          <a:ln w="38100">
+            <a:solidFill>
+              <a:schemeClr val="tx1"/>
+            </a:solidFill>
+          </a:ln>
+        </p:spPr>
+        <p:style>
+          <a:lnRef idx="1">
+            <a:schemeClr val="accent1"/>
+          </a:lnRef>
+          <a:fillRef idx="0">
+            <a:schemeClr val="accent1"/>
+          </a:fillRef>
+          <a:effectRef idx="0">
+            <a:schemeClr val="accent1"/>
+          </a:effectRef>
+          <a:fontRef idx="minor">
+            <a:schemeClr val="tx1"/>
+          </a:fontRef>
+        </p:style>
+      </p:cxnSp>
+      <p:sp>
+        <p:nvSpPr>
+          <p:cNvPr id="5" name="TextBox 4">
+            <a:extLst>
+              <a:ext uri="{FF2B5EF4-FFF2-40B4-BE49-F238E27FC236}">
+                <a16:creationId xmlns:a16="http://schemas.microsoft.com/office/drawing/2014/main" id="{B711A4F6-69D3-7F4C-BB50-063E1C2CA7F9}"/>
+              </a:ext>
+            </a:extLst>
+          </p:cNvPr>
+          <p:cNvSpPr txBox="1"/>
+          <p:nvPr/>
+        </p:nvSpPr>
+        <p:spPr>
+          <a:xfrm>
+            <a:off x="443052" y="1217076"/>
+            <a:ext cx="1489190" cy="369332"/>
+          </a:xfrm>
+          <a:prstGeom prst="rect">
+            <a:avLst/>
+          </a:prstGeom>
+          <a:noFill/>
+        </p:spPr>
+        <p:txBody>
+          <a:bodyPr wrap="none" lIns="0" tIns="0" rIns="0" bIns="0" rtlCol="0">
+            <a:spAutoFit/>
+          </a:bodyPr>
+          <a:lstStyle/>
+          <a:p>
+            <a:pPr algn="l"/>
+            <a:r>
+              <a:rPr lang="en-US" sz="2400" b="1" dirty="0">
+                <a:solidFill>
+                  <a:srgbClr val="03529B"/>
+                </a:solidFill>
+                <a:latin typeface="Arial" panose="020B0604020202020204" pitchFamily="34" charset="0"/>
+                <a:cs typeface="Arial" panose="020B0604020202020204" pitchFamily="34" charset="0"/>
+              </a:rPr>
+              <a:t>Univariate</a:t>
+            </a:r>
+          </a:p>
+        </p:txBody>
+      </p:sp>
+      <p:cxnSp>
+        <p:nvCxnSpPr>
+          <p:cNvPr id="6" name="Straight Connector 5">
+            <a:extLst>
+              <a:ext uri="{FF2B5EF4-FFF2-40B4-BE49-F238E27FC236}">
+                <a16:creationId xmlns:a16="http://schemas.microsoft.com/office/drawing/2014/main" id="{8E04C2E1-776B-CE45-97A3-B8F2934E412F}"/>
+              </a:ext>
+            </a:extLst>
+          </p:cNvPr>
+          <p:cNvCxnSpPr>
+            <a:cxnSpLocks/>
+          </p:cNvCxnSpPr>
+          <p:nvPr/>
+        </p:nvCxnSpPr>
+        <p:spPr>
+          <a:xfrm>
+            <a:off x="443052" y="1590104"/>
+            <a:ext cx="5209425" cy="0"/>
+          </a:xfrm>
+          <a:prstGeom prst="line">
+            <a:avLst/>
+          </a:prstGeom>
+          <a:ln w="28575">
+            <a:solidFill>
+              <a:srgbClr val="03529B"/>
+            </a:solidFill>
+          </a:ln>
+        </p:spPr>
+        <p:style>
+          <a:lnRef idx="1">
+            <a:schemeClr val="accent1"/>
+          </a:lnRef>
+          <a:fillRef idx="0">
+            <a:schemeClr val="accent1"/>
+          </a:fillRef>
+          <a:effectRef idx="0">
+            <a:schemeClr val="accent1"/>
+          </a:effectRef>
+          <a:fontRef idx="minor">
+            <a:schemeClr val="tx1"/>
+          </a:fontRef>
+        </p:style>
+      </p:cxnSp>
+      <p:sp>
+        <p:nvSpPr>
+          <p:cNvPr id="9" name="TextBox 8">
+            <a:extLst>
+              <a:ext uri="{FF2B5EF4-FFF2-40B4-BE49-F238E27FC236}">
+                <a16:creationId xmlns:a16="http://schemas.microsoft.com/office/drawing/2014/main" id="{F23B0CA9-40D5-8D47-9DE9-C9D5807BD6C8}"/>
+              </a:ext>
+            </a:extLst>
+          </p:cNvPr>
+          <p:cNvSpPr txBox="1"/>
+          <p:nvPr/>
+        </p:nvSpPr>
+        <p:spPr>
+          <a:xfrm>
+            <a:off x="6084525" y="1217076"/>
+            <a:ext cx="1301638" cy="369332"/>
+          </a:xfrm>
+          <a:prstGeom prst="rect">
+            <a:avLst/>
+          </a:prstGeom>
+          <a:noFill/>
+        </p:spPr>
+        <p:txBody>
+          <a:bodyPr wrap="none" lIns="0" tIns="0" rIns="0" bIns="0" rtlCol="0">
+            <a:spAutoFit/>
+          </a:bodyPr>
+          <a:lstStyle/>
+          <a:p>
+            <a:pPr algn="l"/>
+            <a:r>
+              <a:rPr lang="en-US" sz="2400" b="1" dirty="0">
+                <a:solidFill>
+                  <a:srgbClr val="03529B"/>
+                </a:solidFill>
+                <a:latin typeface="Arial" panose="020B0604020202020204" pitchFamily="34" charset="0"/>
+                <a:cs typeface="Arial" panose="020B0604020202020204" pitchFamily="34" charset="0"/>
+              </a:rPr>
+              <a:t>Bivariate</a:t>
+            </a:r>
+          </a:p>
+        </p:txBody>
+      </p:sp>
+      <p:cxnSp>
+        <p:nvCxnSpPr>
+          <p:cNvPr id="10" name="Straight Connector 9">
+            <a:extLst>
+              <a:ext uri="{FF2B5EF4-FFF2-40B4-BE49-F238E27FC236}">
+                <a16:creationId xmlns:a16="http://schemas.microsoft.com/office/drawing/2014/main" id="{507A2FB3-2C54-BC4A-AA82-F67A1475D7DB}"/>
+              </a:ext>
+            </a:extLst>
+          </p:cNvPr>
+          <p:cNvCxnSpPr>
+            <a:cxnSpLocks/>
+          </p:cNvCxnSpPr>
+          <p:nvPr/>
+        </p:nvCxnSpPr>
+        <p:spPr>
+          <a:xfrm>
+            <a:off x="6084525" y="1590104"/>
+            <a:ext cx="5646762" cy="0"/>
+          </a:xfrm>
+          <a:prstGeom prst="line">
+            <a:avLst/>
+          </a:prstGeom>
+          <a:ln w="28575">
+            <a:solidFill>
+              <a:srgbClr val="03529B"/>
+            </a:solidFill>
+          </a:ln>
+        </p:spPr>
+        <p:style>
+          <a:lnRef idx="1">
+            <a:schemeClr val="accent1"/>
+          </a:lnRef>
+          <a:fillRef idx="0">
+            <a:schemeClr val="accent1"/>
+          </a:fillRef>
+          <a:effectRef idx="0">
+            <a:schemeClr val="accent1"/>
+          </a:effectRef>
+          <a:fontRef idx="minor">
+            <a:schemeClr val="tx1"/>
+          </a:fontRef>
+        </p:style>
+      </p:cxnSp>
+      <p:pic>
+        <p:nvPicPr>
+          <p:cNvPr id="22" name="Picture 21" descr="Chart, histogram&#10;&#10;Description automatically generated">
+            <a:extLst>
+              <a:ext uri="{FF2B5EF4-FFF2-40B4-BE49-F238E27FC236}">
+                <a16:creationId xmlns:a16="http://schemas.microsoft.com/office/drawing/2014/main" id="{0A2248FB-A813-A149-B445-71335989EA4A}"/>
+              </a:ext>
+            </a:extLst>
+          </p:cNvPr>
+          <p:cNvPicPr>
+            <a:picLocks noChangeAspect="1"/>
+          </p:cNvPicPr>
+          <p:nvPr/>
+        </p:nvPicPr>
+        <p:blipFill rotWithShape="1">
+          <a:blip r:embed="rId2"/>
+          <a:srcRect t="6488"/>
+          <a:stretch/>
+        </p:blipFill>
+        <p:spPr>
+          <a:xfrm>
+            <a:off x="462005" y="1804256"/>
+            <a:ext cx="5209424" cy="3897141"/>
+          </a:xfrm>
+          <a:prstGeom prst="rect">
+            <a:avLst/>
+          </a:prstGeom>
+        </p:spPr>
+      </p:pic>
+      <mc:AlternateContent xmlns:mc="http://schemas.openxmlformats.org/markup-compatibility/2006">
+        <mc:Choice xmlns:a14="http://schemas.microsoft.com/office/drawing/2010/main" Requires="a14">
+          <p:sp>
+            <p:nvSpPr>
+              <p:cNvPr id="24" name="Rectangle 23">
+                <a:extLst>
+                  <a:ext uri="{FF2B5EF4-FFF2-40B4-BE49-F238E27FC236}">
+                    <a16:creationId xmlns:a16="http://schemas.microsoft.com/office/drawing/2014/main" id="{CC04480D-2E39-A64A-AF66-88650F8D96EE}"/>
+                  </a:ext>
+                </a:extLst>
+              </p:cNvPr>
+              <p:cNvSpPr/>
+              <p:nvPr/>
+            </p:nvSpPr>
+            <p:spPr>
+              <a:xfrm>
+                <a:off x="448649" y="5918410"/>
+                <a:ext cx="5209424" cy="490860"/>
+              </a:xfrm>
+              <a:prstGeom prst="rect">
+                <a:avLst/>
+              </a:prstGeom>
+              <a:solidFill>
+                <a:schemeClr val="bg1">
+                  <a:lumMod val="95000"/>
+                </a:schemeClr>
+              </a:solidFill>
+              <a:ln w="28575">
+                <a:noFill/>
+              </a:ln>
+            </p:spPr>
+            <p:style>
+              <a:lnRef idx="2">
+                <a:schemeClr val="accent1">
+                  <a:shade val="50000"/>
+                </a:schemeClr>
+              </a:lnRef>
+              <a:fillRef idx="1">
+                <a:schemeClr val="accent1"/>
+              </a:fillRef>
+              <a:effectRef idx="0">
+                <a:schemeClr val="accent1"/>
+              </a:effectRef>
+              <a:fontRef idx="minor">
+                <a:schemeClr val="lt1"/>
+              </a:fontRef>
+            </p:style>
+            <p:txBody>
+              <a:bodyPr rtlCol="0" anchor="ctr"/>
+              <a:lstStyle/>
+              <a:p>
+                <a:pPr algn="ctr"/>
+                <a:r>
+                  <a:rPr lang="en-US" sz="2000" dirty="0">
+                    <a:solidFill>
+                      <a:schemeClr val="tx1"/>
+                    </a:solidFill>
+                    <a:latin typeface="Arial" panose="020B0604020202020204" pitchFamily="34" charset="0"/>
+                    <a:cs typeface="Arial" panose="020B0604020202020204" pitchFamily="34" charset="0"/>
+                  </a:rPr>
+                  <a:t>Zero inflation </a:t>
+                </a:r>
+                <a14:m>
+                  <m:oMath xmlns:m="http://schemas.openxmlformats.org/officeDocument/2006/math">
+                    <m:r>
+                      <a:rPr lang="de-DE" sz="2000" i="1">
+                        <a:solidFill>
+                          <a:schemeClr val="tx1"/>
+                        </a:solidFill>
+                        <a:latin typeface="Cambria Math" panose="02040503050406030204" pitchFamily="18" charset="0"/>
+                        <a:cs typeface="Arial" panose="020B0604020202020204" pitchFamily="34" charset="0"/>
+                      </a:rPr>
+                      <m:t>→</m:t>
+                    </m:r>
+                  </m:oMath>
+                </a14:m>
+                <a:r>
+                  <a:rPr lang="en-US" sz="2000" dirty="0">
+                    <a:solidFill>
+                      <a:schemeClr val="tx1"/>
+                    </a:solidFill>
+                    <a:latin typeface="Arial" panose="020B0604020202020204" pitchFamily="34" charset="0"/>
+                    <a:cs typeface="Arial" panose="020B0604020202020204" pitchFamily="34" charset="0"/>
+                  </a:rPr>
+                  <a:t> model </a:t>
+                </a:r>
+                <a14:m>
+                  <m:oMath xmlns:m="http://schemas.openxmlformats.org/officeDocument/2006/math">
+                    <m:r>
+                      <a:rPr lang="de-DE" sz="2000" i="1">
+                        <a:solidFill>
+                          <a:schemeClr val="tx1"/>
+                        </a:solidFill>
+                        <a:latin typeface="Cambria Math" panose="02040503050406030204" pitchFamily="18" charset="0"/>
+                        <a:cs typeface="Arial" panose="020B0604020202020204" pitchFamily="34" charset="0"/>
+                      </a:rPr>
+                      <m:t>𝑟𝑒</m:t>
+                    </m:r>
+                    <m:r>
+                      <a:rPr lang="de-DE" sz="2000" i="1">
+                        <a:solidFill>
+                          <a:schemeClr val="tx1"/>
+                        </a:solidFill>
+                        <a:latin typeface="Cambria Math" panose="02040503050406030204" pitchFamily="18" charset="0"/>
+                        <a:cs typeface="Arial" panose="020B0604020202020204" pitchFamily="34" charset="0"/>
+                      </a:rPr>
+                      <m:t>78−</m:t>
+                    </m:r>
+                    <m:r>
+                      <a:rPr lang="de-DE" sz="2000" i="1">
+                        <a:solidFill>
+                          <a:schemeClr val="tx1"/>
+                        </a:solidFill>
+                        <a:latin typeface="Cambria Math" panose="02040503050406030204" pitchFamily="18" charset="0"/>
+                        <a:cs typeface="Arial" panose="020B0604020202020204" pitchFamily="34" charset="0"/>
+                      </a:rPr>
+                      <m:t>𝑟𝑒</m:t>
+                    </m:r>
+                    <m:r>
+                      <a:rPr lang="de-DE" sz="2000" i="1">
+                        <a:solidFill>
+                          <a:schemeClr val="tx1"/>
+                        </a:solidFill>
+                        <a:latin typeface="Cambria Math" panose="02040503050406030204" pitchFamily="18" charset="0"/>
+                        <a:cs typeface="Arial" panose="020B0604020202020204" pitchFamily="34" charset="0"/>
+                      </a:rPr>
+                      <m:t>74</m:t>
+                    </m:r>
+                  </m:oMath>
+                </a14:m>
+                <a:r>
+                  <a:rPr lang="en-US" sz="2000" dirty="0">
+                    <a:solidFill>
+                      <a:schemeClr val="tx1"/>
+                    </a:solidFill>
+                    <a:latin typeface="Arial" panose="020B0604020202020204" pitchFamily="34" charset="0"/>
+                    <a:cs typeface="Arial" panose="020B0604020202020204" pitchFamily="34" charset="0"/>
+                  </a:rPr>
+                  <a:t> instead</a:t>
+                </a:r>
+              </a:p>
+            </p:txBody>
+          </p:sp>
+        </mc:Choice>
+        <mc:Fallback>
+          <p:sp>
+            <p:nvSpPr>
+              <p:cNvPr id="24" name="Rectangle 23">
+                <a:extLst>
+                  <a:ext uri="{FF2B5EF4-FFF2-40B4-BE49-F238E27FC236}">
+                    <a16:creationId xmlns:a16="http://schemas.microsoft.com/office/drawing/2014/main" id="{CC04480D-2E39-A64A-AF66-88650F8D96EE}"/>
+                  </a:ext>
+                </a:extLst>
+              </p:cNvPr>
+              <p:cNvSpPr>
+                <a:spLocks noRot="1" noChangeAspect="1" noMove="1" noResize="1" noEditPoints="1" noAdjustHandles="1" noChangeArrowheads="1" noChangeShapeType="1" noTextEdit="1"/>
+              </p:cNvSpPr>
+              <p:nvPr/>
+            </p:nvSpPr>
+            <p:spPr>
+              <a:xfrm>
+                <a:off x="448649" y="5918410"/>
+                <a:ext cx="5209424" cy="490860"/>
+              </a:xfrm>
+              <a:prstGeom prst="rect">
+                <a:avLst/>
+              </a:prstGeom>
+              <a:blipFill>
+                <a:blip r:embed="rId3"/>
+                <a:stretch>
+                  <a:fillRect b="-12821"/>
+                </a:stretch>
+              </a:blipFill>
+              <a:ln w="28575">
+                <a:noFill/>
+              </a:ln>
+            </p:spPr>
+            <p:txBody>
+              <a:bodyPr/>
+              <a:lstStyle/>
+              <a:p>
+                <a:r>
+                  <a:rPr lang="en-US">
+                    <a:noFill/>
+                  </a:rPr>
+                  <a:t> </a:t>
+                </a:r>
+              </a:p>
+            </p:txBody>
+          </p:sp>
+        </mc:Fallback>
+      </mc:AlternateContent>
+    </p:spTree>
+    <p:extLst>
+      <p:ext uri="{BB962C8B-B14F-4D97-AF65-F5344CB8AC3E}">
+        <p14:creationId xmlns:p14="http://schemas.microsoft.com/office/powerpoint/2010/main" val="1056024621"/>
+      </p:ext>
+    </p:extLst>
+  </p:cSld>
+  <p:clrMapOvr>
+    <a:masterClrMapping/>
+  </p:clrMapOvr>
+</p:sld>
+</file>
+
+<file path=ppt/slides/slide5.xml><?xml version="1.0" encoding="utf-8"?>
+<p:sld xmlns:a="http://schemas.openxmlformats.org/drawingml/2006/main" xmlns:r="http://schemas.openxmlformats.org/officeDocument/2006/relationships" xmlns:p="http://schemas.openxmlformats.org/presentationml/2006/main">
+  <p:cSld>
+    <p:spTree>
+      <p:nvGrpSpPr>
+        <p:cNvPr id="1" name=""/>
+        <p:cNvGrpSpPr/>
+        <p:nvPr/>
+      </p:nvGrpSpPr>
+      <p:grpSpPr>
+        <a:xfrm>
+          <a:off x="0" y="0"/>
+          <a:ext cx="0" cy="0"/>
+          <a:chOff x="0" y="0"/>
+          <a:chExt cx="0" cy="0"/>
+        </a:xfrm>
+      </p:grpSpPr>
+      <p:sp>
+        <p:nvSpPr>
+          <p:cNvPr id="2" name="Slide Number Placeholder 1">
+            <a:extLst>
+              <a:ext uri="{FF2B5EF4-FFF2-40B4-BE49-F238E27FC236}">
+                <a16:creationId xmlns:a16="http://schemas.microsoft.com/office/drawing/2014/main" id="{E57A78EA-4EE9-8746-BEC8-41270460FFF2}"/>
+              </a:ext>
+            </a:extLst>
+          </p:cNvPr>
+          <p:cNvSpPr>
+            <a:spLocks noGrp="1"/>
+          </p:cNvSpPr>
+          <p:nvPr>
+            <p:ph type="sldNum" sz="quarter" idx="12"/>
+          </p:nvPr>
+        </p:nvSpPr>
+        <p:spPr/>
+        <p:txBody>
+          <a:bodyPr/>
+          <a:lstStyle/>
+          <a:p>
+            <a:fld id="{2D00CA07-45C7-8142-9F4D-3A07AD48DFA1}" type="slidenum">
+              <a:rPr lang="en-US" smtClean="0"/>
+              <a:t>5</a:t>
+            </a:fld>
+            <a:endParaRPr lang="en-US"/>
+          </a:p>
+        </p:txBody>
+      </p:sp>
+    </p:spTree>
+    <p:extLst>
+      <p:ext uri="{BB962C8B-B14F-4D97-AF65-F5344CB8AC3E}">
+        <p14:creationId xmlns:p14="http://schemas.microsoft.com/office/powerpoint/2010/main" val="3676585838"/>
+      </p:ext>
+    </p:extLst>
+  </p:cSld>
+  <p:clrMapOvr>
+    <a:masterClrMapping/>
+  </p:clrMapOvr>
+</p:sld>
+</file>
+
+<file path=ppt/slides/slide6.xml><?xml version="1.0" encoding="utf-8"?>
+<p:sld xmlns:a="http://schemas.openxmlformats.org/drawingml/2006/main" xmlns:r="http://schemas.openxmlformats.org/officeDocument/2006/relationships" xmlns:p="http://schemas.openxmlformats.org/presentationml/2006/main">
+  <p:cSld>
+    <p:spTree>
+      <p:nvGrpSpPr>
+        <p:cNvPr id="1" name=""/>
+        <p:cNvGrpSpPr/>
+        <p:nvPr/>
+      </p:nvGrpSpPr>
+      <p:grpSpPr>
+        <a:xfrm>
+          <a:off x="0" y="0"/>
+          <a:ext cx="0" cy="0"/>
+          <a:chOff x="0" y="0"/>
+          <a:chExt cx="0" cy="0"/>
+        </a:xfrm>
+      </p:grpSpPr>
+      <p:sp>
+        <p:nvSpPr>
+          <p:cNvPr id="2" name="Slide Number Placeholder 1">
+            <a:extLst>
+              <a:ext uri="{FF2B5EF4-FFF2-40B4-BE49-F238E27FC236}">
+                <a16:creationId xmlns:a16="http://schemas.microsoft.com/office/drawing/2014/main" id="{7DA29FE0-3C90-3B46-825F-4D8A7CC71826}"/>
+              </a:ext>
+            </a:extLst>
+          </p:cNvPr>
+          <p:cNvSpPr>
+            <a:spLocks noGrp="1"/>
+          </p:cNvSpPr>
+          <p:nvPr>
+            <p:ph type="sldNum" sz="quarter" idx="12"/>
+          </p:nvPr>
+        </p:nvSpPr>
+        <p:spPr/>
+        <p:txBody>
+          <a:bodyPr/>
+          <a:lstStyle/>
+          <a:p>
+            <a:fld id="{2D00CA07-45C7-8142-9F4D-3A07AD48DFA1}" type="slidenum">
+              <a:rPr lang="en-US" smtClean="0"/>
+              <a:t>6</a:t>
+            </a:fld>
+            <a:endParaRPr lang="en-US"/>
+          </a:p>
+        </p:txBody>
+      </p:sp>
+    </p:spTree>
+    <p:extLst>
+      <p:ext uri="{BB962C8B-B14F-4D97-AF65-F5344CB8AC3E}">
+        <p14:creationId xmlns:p14="http://schemas.microsoft.com/office/powerpoint/2010/main" val="3886266033"/>
+      </p:ext>
+    </p:extLst>
+  </p:cSld>
+  <p:clrMapOvr>
+    <a:masterClrMapping/>
+  </p:clrMapOvr>
+</p:sld>
+</file>
+
+<file path=ppt/slides/slide7.xml><?xml version="1.0" encoding="utf-8"?>
 <p:sld xmlns:a="http://schemas.openxmlformats.org/drawingml/2006/main" xmlns:r="http://schemas.openxmlformats.org/officeDocument/2006/relationships" xmlns:p="http://schemas.openxmlformats.org/presentationml/2006/main" show="0">
   <p:cSld>
     <p:spTree>
@@ -4412,7 +5758,7 @@
           <a:p>
             <a:fld id="{2D00CA07-45C7-8142-9F4D-3A07AD48DFA1}" type="slidenum">
               <a:rPr lang="en-US" smtClean="0"/>
-              <a:t>3</a:t>
+              <a:t>7</a:t>
             </a:fld>
             <a:endParaRPr lang="en-US"/>
           </a:p>
@@ -4606,7 +5952,7 @@
 </p:sld>
 </file>
 
-<file path=ppt/slides/slide4.xml><?xml version="1.0" encoding="utf-8"?>
+<file path=ppt/slides/slide8.xml><?xml version="1.0" encoding="utf-8"?>
 <p:sld xmlns:a="http://schemas.openxmlformats.org/drawingml/2006/main" xmlns:r="http://schemas.openxmlformats.org/officeDocument/2006/relationships" xmlns:p="http://schemas.openxmlformats.org/presentationml/2006/main">
   <p:cSld>
     <p:spTree>
@@ -4646,7 +5992,7 @@
           <a:p>
             <a:fld id="{2D00CA07-45C7-8142-9F4D-3A07AD48DFA1}" type="slidenum">
               <a:rPr lang="en-US" smtClean="0"/>
-              <a:t>4</a:t>
+              <a:t>8</a:t>
             </a:fld>
             <a:endParaRPr lang="en-US"/>
           </a:p>
@@ -4665,7 +6011,7 @@
 </p:sld>
 </file>
 
-<file path=ppt/slides/slide5.xml><?xml version="1.0" encoding="utf-8"?>
+<file path=ppt/slides/slide9.xml><?xml version="1.0" encoding="utf-8"?>
 <p:sld xmlns:a="http://schemas.openxmlformats.org/drawingml/2006/main" xmlns:r="http://schemas.openxmlformats.org/officeDocument/2006/relationships" xmlns:p="http://schemas.openxmlformats.org/presentationml/2006/main" show="0">
   <p:cSld>
     <p:spTree>
@@ -4705,7 +6051,7 @@
           <a:p>
             <a:fld id="{2D00CA07-45C7-8142-9F4D-3A07AD48DFA1}" type="slidenum">
               <a:rPr lang="en-US" smtClean="0"/>
-              <a:t>5</a:t>
+              <a:t>9</a:t>
             </a:fld>
             <a:endParaRPr lang="en-US"/>
           </a:p>
@@ -4795,7 +6141,7 @@
     </p:spTree>
     <p:extLst>
       <p:ext uri="{BB962C8B-B14F-4D97-AF65-F5344CB8AC3E}">
-        <p14:creationId xmlns:p14="http://schemas.microsoft.com/office/powerpoint/2010/main" val="1887103581"/>
+        <p14:creationId xmlns:p14="http://schemas.microsoft.com/office/powerpoint/2010/main" val="888186416"/>
       </p:ext>
     </p:extLst>
   </p:cSld>

</xml_diff>

<commit_message>
plots and slides almost done
</commit_message>
<xml_diff>
--- a/Presentation/slide_deck.pptx
+++ b/Presentation/slide_deck.pptx
@@ -4029,8 +4029,8 @@
         </p:nvSpPr>
         <p:spPr>
           <a:xfrm>
-            <a:off x="459610" y="1196752"/>
-            <a:ext cx="11033408" cy="2954655"/>
+            <a:off x="455385" y="1268760"/>
+            <a:ext cx="11270572" cy="1477328"/>
           </a:xfrm>
           <a:prstGeom prst="rect">
             <a:avLst/>
@@ -4070,51 +4070,10 @@
             </a:r>
           </a:p>
           <a:p>
-            <a:pPr marL="457200" indent="-457200">
+            <a:pPr marL="457200" indent="-457200" algn="just">
               <a:buFont typeface="+mj-lt"/>
               <a:buAutoNum type="arabicPeriod"/>
             </a:pPr>
-            <a:endParaRPr lang="en-US" sz="2400" dirty="0">
-              <a:latin typeface="Arial" panose="020B0604020202020204" pitchFamily="34" charset="0"/>
-              <a:cs typeface="Arial" panose="020B0604020202020204" pitchFamily="34" charset="0"/>
-            </a:endParaRPr>
-          </a:p>
-          <a:p>
-            <a:pPr marL="457200" indent="-457200">
-              <a:buFont typeface="+mj-lt"/>
-              <a:buAutoNum type="arabicPeriod"/>
-            </a:pPr>
-            <a:r>
-              <a:rPr lang="en-US" sz="2400" dirty="0" err="1">
-                <a:latin typeface="Arial" panose="020B0604020202020204" pitchFamily="34" charset="0"/>
-                <a:cs typeface="Arial" panose="020B0604020202020204" pitchFamily="34" charset="0"/>
-              </a:rPr>
-              <a:t>Dehejia</a:t>
-            </a:r>
-            <a:r>
-              <a:rPr lang="en-US" sz="2400" dirty="0">
-                <a:latin typeface="Arial" panose="020B0604020202020204" pitchFamily="34" charset="0"/>
-                <a:cs typeface="Arial" panose="020B0604020202020204" pitchFamily="34" charset="0"/>
-              </a:rPr>
-              <a:t>, R., and Wahba, S. (1999), Causal Effects in Nonexperimental Studies: Reevaluating the Evaluation of Training Programs, </a:t>
-            </a:r>
-            <a:r>
-              <a:rPr lang="en-US" sz="2400" i="1" dirty="0">
-                <a:latin typeface="Arial" panose="020B0604020202020204" pitchFamily="34" charset="0"/>
-                <a:cs typeface="Arial" panose="020B0604020202020204" pitchFamily="34" charset="0"/>
-              </a:rPr>
-              <a:t>Journal of the American Statistical Association</a:t>
-            </a:r>
-            <a:r>
-              <a:rPr lang="en-US" sz="2400" dirty="0">
-                <a:latin typeface="Arial" panose="020B0604020202020204" pitchFamily="34" charset="0"/>
-                <a:cs typeface="Arial" panose="020B0604020202020204" pitchFamily="34" charset="0"/>
-              </a:rPr>
-              <a:t>, 94, 1053-1062. </a:t>
-            </a:r>
-          </a:p>
-          <a:p>
-            <a:pPr algn="l"/>
             <a:endParaRPr lang="en-US" sz="2400" dirty="0">
               <a:latin typeface="Arial" panose="020B0604020202020204" pitchFamily="34" charset="0"/>
               <a:cs typeface="Arial" panose="020B0604020202020204" pitchFamily="34" charset="0"/>
@@ -4906,7 +4865,7 @@
         </p:nvGrpSpPr>
         <p:grpSpPr>
           <a:xfrm>
-            <a:off x="460713" y="4563932"/>
+            <a:off x="448177" y="4493020"/>
             <a:ext cx="11270574" cy="864080"/>
             <a:chOff x="443945" y="4653136"/>
             <a:chExt cx="11270574" cy="864080"/>
@@ -5416,10 +5375,10 @@
       </p:grpSp>
       <p:sp>
         <p:nvSpPr>
-          <p:cNvPr id="33" name="TextBox 32">
-            <a:extLst>
-              <a:ext uri="{FF2B5EF4-FFF2-40B4-BE49-F238E27FC236}">
-                <a16:creationId xmlns:a16="http://schemas.microsoft.com/office/drawing/2014/main" id="{BFAE091F-869F-3C44-B19B-737ECE4E6FE2}"/>
+          <p:cNvPr id="34" name="TextBox 33">
+            <a:extLst>
+              <a:ext uri="{FF2B5EF4-FFF2-40B4-BE49-F238E27FC236}">
+                <a16:creationId xmlns:a16="http://schemas.microsoft.com/office/drawing/2014/main" id="{D69B2B82-5E2A-D246-B549-2E24788E3161}"/>
               </a:ext>
             </a:extLst>
           </p:cNvPr>
@@ -5428,46 +5387,7 @@
         </p:nvSpPr>
         <p:spPr>
           <a:xfrm>
-            <a:off x="460713" y="1321432"/>
-            <a:ext cx="1232710" cy="369332"/>
-          </a:xfrm>
-          <a:prstGeom prst="rect">
-            <a:avLst/>
-          </a:prstGeom>
-          <a:noFill/>
-        </p:spPr>
-        <p:txBody>
-          <a:bodyPr wrap="none" lIns="0" tIns="0" rIns="0" bIns="0" rtlCol="0">
-            <a:spAutoFit/>
-          </a:bodyPr>
-          <a:lstStyle/>
-          <a:p>
-            <a:pPr algn="l"/>
-            <a:r>
-              <a:rPr lang="en-US" sz="2400" b="1" dirty="0">
-                <a:latin typeface="Arial" panose="020B0604020202020204" pitchFamily="34" charset="0"/>
-                <a:cs typeface="Arial" panose="020B0604020202020204" pitchFamily="34" charset="0"/>
-              </a:rPr>
-              <a:t>Data Set</a:t>
-            </a:r>
-          </a:p>
-        </p:txBody>
-      </p:sp>
-      <p:sp>
-        <p:nvSpPr>
-          <p:cNvPr id="34" name="TextBox 33">
-            <a:extLst>
-              <a:ext uri="{FF2B5EF4-FFF2-40B4-BE49-F238E27FC236}">
-                <a16:creationId xmlns:a16="http://schemas.microsoft.com/office/drawing/2014/main" id="{D69B2B82-5E2A-D246-B549-2E24788E3161}"/>
-              </a:ext>
-            </a:extLst>
-          </p:cNvPr>
-          <p:cNvSpPr txBox="1"/>
-          <p:nvPr/>
-        </p:nvSpPr>
-        <p:spPr>
-          <a:xfrm>
-            <a:off x="460713" y="1736390"/>
+            <a:off x="460713" y="1690351"/>
             <a:ext cx="11253806" cy="1477328"/>
           </a:xfrm>
           <a:prstGeom prst="rect">
@@ -5536,10 +5456,10 @@
       </p:sp>
       <p:sp>
         <p:nvSpPr>
-          <p:cNvPr id="35" name="TextBox 34">
-            <a:extLst>
-              <a:ext uri="{FF2B5EF4-FFF2-40B4-BE49-F238E27FC236}">
-                <a16:creationId xmlns:a16="http://schemas.microsoft.com/office/drawing/2014/main" id="{B23CE074-CF8F-7142-B39F-9192279925BF}"/>
+          <p:cNvPr id="18" name="TextBox 17">
+            <a:extLst>
+              <a:ext uri="{FF2B5EF4-FFF2-40B4-BE49-F238E27FC236}">
+                <a16:creationId xmlns:a16="http://schemas.microsoft.com/office/drawing/2014/main" id="{1A92A673-4F25-EE4E-BCB3-F18BF3954779}"/>
               </a:ext>
             </a:extLst>
           </p:cNvPr>
@@ -5548,8 +5468,8 @@
         </p:nvSpPr>
         <p:spPr>
           <a:xfrm>
-            <a:off x="460713" y="3947227"/>
-            <a:ext cx="2632131" cy="369332"/>
+            <a:off x="460713" y="1180895"/>
+            <a:ext cx="2374048" cy="369332"/>
           </a:xfrm>
           <a:prstGeom prst="rect">
             <a:avLst/>
@@ -5557,7 +5477,7 @@
           <a:noFill/>
         </p:spPr>
         <p:txBody>
-          <a:bodyPr wrap="none" lIns="0" tIns="0" rIns="0" bIns="0" rtlCol="0">
+          <a:bodyPr wrap="square" lIns="0" tIns="0" rIns="0" bIns="0" rtlCol="0">
             <a:spAutoFit/>
           </a:bodyPr>
           <a:lstStyle/>
@@ -5565,6 +5485,94 @@
             <a:pPr algn="l"/>
             <a:r>
               <a:rPr lang="en-US" sz="2400" b="1" dirty="0">
+                <a:solidFill>
+                  <a:srgbClr val="03529B"/>
+                </a:solidFill>
+                <a:latin typeface="Arial" panose="020B0604020202020204" pitchFamily="34" charset="0"/>
+                <a:cs typeface="Arial" panose="020B0604020202020204" pitchFamily="34" charset="0"/>
+              </a:rPr>
+              <a:t>Data Set</a:t>
+            </a:r>
+          </a:p>
+        </p:txBody>
+      </p:sp>
+      <p:cxnSp>
+        <p:nvCxnSpPr>
+          <p:cNvPr id="19" name="Straight Connector 18">
+            <a:extLst>
+              <a:ext uri="{FF2B5EF4-FFF2-40B4-BE49-F238E27FC236}">
+                <a16:creationId xmlns:a16="http://schemas.microsoft.com/office/drawing/2014/main" id="{0B4D467B-2FA6-1F40-BA04-2CCAADEF0CC3}"/>
+              </a:ext>
+            </a:extLst>
+          </p:cNvPr>
+          <p:cNvCxnSpPr>
+            <a:cxnSpLocks/>
+          </p:cNvCxnSpPr>
+          <p:nvPr/>
+        </p:nvCxnSpPr>
+        <p:spPr>
+          <a:xfrm>
+            <a:off x="460713" y="1553923"/>
+            <a:ext cx="1242799" cy="0"/>
+          </a:xfrm>
+          <a:prstGeom prst="line">
+            <a:avLst/>
+          </a:prstGeom>
+          <a:ln w="28575">
+            <a:solidFill>
+              <a:srgbClr val="03529B"/>
+            </a:solidFill>
+          </a:ln>
+        </p:spPr>
+        <p:style>
+          <a:lnRef idx="1">
+            <a:schemeClr val="accent1"/>
+          </a:lnRef>
+          <a:fillRef idx="0">
+            <a:schemeClr val="accent1"/>
+          </a:fillRef>
+          <a:effectRef idx="0">
+            <a:schemeClr val="accent1"/>
+          </a:effectRef>
+          <a:fontRef idx="minor">
+            <a:schemeClr val="tx1"/>
+          </a:fontRef>
+        </p:style>
+      </p:cxnSp>
+      <p:sp>
+        <p:nvSpPr>
+          <p:cNvPr id="23" name="TextBox 22">
+            <a:extLst>
+              <a:ext uri="{FF2B5EF4-FFF2-40B4-BE49-F238E27FC236}">
+                <a16:creationId xmlns:a16="http://schemas.microsoft.com/office/drawing/2014/main" id="{83EBDE7B-47A1-EF4A-BE41-AF6C90451A2A}"/>
+              </a:ext>
+            </a:extLst>
+          </p:cNvPr>
+          <p:cNvSpPr txBox="1"/>
+          <p:nvPr/>
+        </p:nvSpPr>
+        <p:spPr>
+          <a:xfrm>
+            <a:off x="448177" y="3890659"/>
+            <a:ext cx="3259023" cy="369332"/>
+          </a:xfrm>
+          <a:prstGeom prst="rect">
+            <a:avLst/>
+          </a:prstGeom>
+          <a:noFill/>
+        </p:spPr>
+        <p:txBody>
+          <a:bodyPr wrap="square" lIns="0" tIns="0" rIns="0" bIns="0" rtlCol="0">
+            <a:spAutoFit/>
+          </a:bodyPr>
+          <a:lstStyle/>
+          <a:p>
+            <a:pPr algn="l"/>
+            <a:r>
+              <a:rPr lang="en-US" sz="2400" b="1" dirty="0">
+                <a:solidFill>
+                  <a:srgbClr val="03529B"/>
+                </a:solidFill>
                 <a:latin typeface="Arial" panose="020B0604020202020204" pitchFamily="34" charset="0"/>
                 <a:cs typeface="Arial" panose="020B0604020202020204" pitchFamily="34" charset="0"/>
               </a:rPr>
@@ -5573,6 +5581,49 @@
           </a:p>
         </p:txBody>
       </p:sp>
+      <p:cxnSp>
+        <p:nvCxnSpPr>
+          <p:cNvPr id="24" name="Straight Connector 23">
+            <a:extLst>
+              <a:ext uri="{FF2B5EF4-FFF2-40B4-BE49-F238E27FC236}">
+                <a16:creationId xmlns:a16="http://schemas.microsoft.com/office/drawing/2014/main" id="{51A26D99-B08C-E744-9887-0FD9FC21D83A}"/>
+              </a:ext>
+            </a:extLst>
+          </p:cNvPr>
+          <p:cNvCxnSpPr>
+            <a:cxnSpLocks/>
+          </p:cNvCxnSpPr>
+          <p:nvPr/>
+        </p:nvCxnSpPr>
+        <p:spPr>
+          <a:xfrm>
+            <a:off x="448178" y="4263687"/>
+            <a:ext cx="2610951" cy="0"/>
+          </a:xfrm>
+          <a:prstGeom prst="line">
+            <a:avLst/>
+          </a:prstGeom>
+          <a:ln w="28575">
+            <a:solidFill>
+              <a:srgbClr val="03529B"/>
+            </a:solidFill>
+          </a:ln>
+        </p:spPr>
+        <p:style>
+          <a:lnRef idx="1">
+            <a:schemeClr val="accent1"/>
+          </a:lnRef>
+          <a:fillRef idx="0">
+            <a:schemeClr val="accent1"/>
+          </a:fillRef>
+          <a:effectRef idx="0">
+            <a:schemeClr val="accent1"/>
+          </a:effectRef>
+          <a:fontRef idx="minor">
+            <a:schemeClr val="tx1"/>
+          </a:fontRef>
+        </p:style>
+      </p:cxnSp>
     </p:spTree>
     <p:extLst>
       <p:ext uri="{BB962C8B-B14F-4D97-AF65-F5344CB8AC3E}">
@@ -7250,7 +7301,7 @@
         </p:nvSpPr>
         <p:spPr>
           <a:xfrm>
-            <a:off x="461076" y="1196752"/>
+            <a:off x="461076" y="1653486"/>
             <a:ext cx="2371181" cy="1052235"/>
           </a:xfrm>
           <a:prstGeom prst="rect">
@@ -7328,7 +7379,7 @@
         </p:nvSpPr>
         <p:spPr>
           <a:xfrm>
-            <a:off x="9340198" y="1196751"/>
+            <a:off x="9340198" y="1653485"/>
             <a:ext cx="2371181" cy="1052235"/>
           </a:xfrm>
           <a:prstGeom prst="rect">
@@ -7367,7 +7418,7 @@
           <a:p>
             <a:pPr algn="ctr"/>
             <a:r>
-              <a:rPr lang="en-US" sz="2000" b="1">
+              <a:rPr lang="en-US" sz="2000" b="1" dirty="0">
                 <a:solidFill>
                   <a:schemeClr val="tx1"/>
                 </a:solidFill>
@@ -7380,7 +7431,7 @@
           <a:p>
             <a:pPr algn="ctr"/>
             <a:r>
-              <a:rPr lang="en-US" sz="2000">
+              <a:rPr lang="en-US" sz="2000" dirty="0">
                 <a:solidFill>
                   <a:schemeClr val="tx1"/>
                 </a:solidFill>
@@ -7409,7 +7460,7 @@
         </p:nvCxnSpPr>
         <p:spPr>
           <a:xfrm flipV="1">
-            <a:off x="2832257" y="1722869"/>
+            <a:off x="2832257" y="2179603"/>
             <a:ext cx="6507941" cy="1"/>
           </a:xfrm>
           <a:prstGeom prst="straightConnector1">
@@ -7451,8 +7502,8 @@
         </p:nvGrpSpPr>
         <p:grpSpPr>
           <a:xfrm>
-            <a:off x="5025379" y="1734945"/>
-            <a:ext cx="2121695" cy="1719146"/>
+            <a:off x="5025380" y="2179601"/>
+            <a:ext cx="2121695" cy="1490953"/>
             <a:chOff x="4655840" y="1660460"/>
             <a:chExt cx="2121695" cy="1781556"/>
           </a:xfrm>
@@ -7595,45 +7646,6 @@
           </p:style>
         </p:cxnSp>
       </p:grpSp>
-      <p:sp>
-        <p:nvSpPr>
-          <p:cNvPr id="21" name="TextBox 20">
-            <a:extLst>
-              <a:ext uri="{FF2B5EF4-FFF2-40B4-BE49-F238E27FC236}">
-                <a16:creationId xmlns:a16="http://schemas.microsoft.com/office/drawing/2014/main" id="{F5316E98-337B-774C-AD04-98D012460F04}"/>
-              </a:ext>
-            </a:extLst>
-          </p:cNvPr>
-          <p:cNvSpPr txBox="1"/>
-          <p:nvPr/>
-        </p:nvSpPr>
-        <p:spPr>
-          <a:xfrm>
-            <a:off x="460713" y="3640625"/>
-            <a:ext cx="2374048" cy="369332"/>
-          </a:xfrm>
-          <a:prstGeom prst="rect">
-            <a:avLst/>
-          </a:prstGeom>
-          <a:noFill/>
-        </p:spPr>
-        <p:txBody>
-          <a:bodyPr wrap="none" lIns="0" tIns="0" rIns="0" bIns="0" rtlCol="0">
-            <a:spAutoFit/>
-          </a:bodyPr>
-          <a:lstStyle/>
-          <a:p>
-            <a:pPr algn="l"/>
-            <a:r>
-              <a:rPr lang="en-US" sz="2400" b="1" dirty="0">
-                <a:latin typeface="Arial" panose="020B0604020202020204" pitchFamily="34" charset="0"/>
-                <a:cs typeface="Arial" panose="020B0604020202020204" pitchFamily="34" charset="0"/>
-              </a:rPr>
-              <a:t>Resulting Model</a:t>
-            </a:r>
-          </a:p>
-        </p:txBody>
-      </p:sp>
       <mc:AlternateContent xmlns:mc="http://schemas.openxmlformats.org/markup-compatibility/2006">
         <mc:Choice xmlns:a14="http://schemas.microsoft.com/office/drawing/2010/main" Requires="a14">
           <p:sp>
@@ -7650,7 +7662,7 @@
             </p:nvSpPr>
             <p:spPr>
               <a:xfrm>
-                <a:off x="3045125" y="4012310"/>
+                <a:off x="3057640" y="4381936"/>
                 <a:ext cx="6057171" cy="388889"/>
               </a:xfrm>
               <a:prstGeom prst="rect">
@@ -7953,7 +7965,7 @@
             </p:nvSpPr>
             <p:spPr>
               <a:xfrm>
-                <a:off x="3045125" y="4012310"/>
+                <a:off x="3057640" y="4381936"/>
                 <a:ext cx="6057171" cy="388889"/>
               </a:xfrm>
               <a:prstGeom prst="rect">
@@ -7962,7 +7974,7 @@
               <a:blipFill>
                 <a:blip r:embed="rId2"/>
                 <a:stretch>
-                  <a:fillRect l="-629" t="-18750" r="-629" b="-34375"/>
+                  <a:fillRect l="-418" t="-22581" r="-418" b="-35484"/>
                 </a:stretch>
               </a:blipFill>
             </p:spPr>
@@ -8003,7 +8015,7 @@
         </p:blipFill>
         <p:spPr>
           <a:xfrm>
-            <a:off x="3067414" y="4775326"/>
+            <a:off x="3057640" y="4957888"/>
             <a:ext cx="6057171" cy="1581024"/>
           </a:xfrm>
           <a:prstGeom prst="rect">
@@ -8011,6 +8023,112 @@
           </a:prstGeom>
         </p:spPr>
       </p:pic>
+      <p:grpSp>
+        <p:nvGrpSpPr>
+          <p:cNvPr id="24" name="Group 23">
+            <a:extLst>
+              <a:ext uri="{FF2B5EF4-FFF2-40B4-BE49-F238E27FC236}">
+                <a16:creationId xmlns:a16="http://schemas.microsoft.com/office/drawing/2014/main" id="{E91A6021-65BA-7341-AF38-988EB0D9E164}"/>
+              </a:ext>
+            </a:extLst>
+          </p:cNvPr>
+          <p:cNvGrpSpPr/>
+          <p:nvPr/>
+        </p:nvGrpSpPr>
+        <p:grpSpPr>
+          <a:xfrm>
+            <a:off x="440893" y="3965766"/>
+            <a:ext cx="2374048" cy="373028"/>
+            <a:chOff x="444280" y="3967614"/>
+            <a:chExt cx="2374048" cy="373028"/>
+          </a:xfrm>
+        </p:grpSpPr>
+        <p:sp>
+          <p:nvSpPr>
+            <p:cNvPr id="15" name="TextBox 14">
+              <a:extLst>
+                <a:ext uri="{FF2B5EF4-FFF2-40B4-BE49-F238E27FC236}">
+                  <a16:creationId xmlns:a16="http://schemas.microsoft.com/office/drawing/2014/main" id="{03706DDA-8DD0-B044-9CF8-CD6173DB2B65}"/>
+                </a:ext>
+              </a:extLst>
+            </p:cNvPr>
+            <p:cNvSpPr txBox="1"/>
+            <p:nvPr/>
+          </p:nvSpPr>
+          <p:spPr>
+            <a:xfrm>
+              <a:off x="444280" y="3967614"/>
+              <a:ext cx="2374048" cy="369332"/>
+            </a:xfrm>
+            <a:prstGeom prst="rect">
+              <a:avLst/>
+            </a:prstGeom>
+            <a:noFill/>
+          </p:spPr>
+          <p:txBody>
+            <a:bodyPr wrap="square" lIns="0" tIns="0" rIns="0" bIns="0" rtlCol="0">
+              <a:spAutoFit/>
+            </a:bodyPr>
+            <a:lstStyle/>
+            <a:p>
+              <a:pPr algn="l"/>
+              <a:r>
+                <a:rPr lang="en-US" sz="2400" b="1" dirty="0">
+                  <a:solidFill>
+                    <a:srgbClr val="03529B"/>
+                  </a:solidFill>
+                  <a:latin typeface="Arial" panose="020B0604020202020204" pitchFamily="34" charset="0"/>
+                  <a:cs typeface="Arial" panose="020B0604020202020204" pitchFamily="34" charset="0"/>
+                </a:rPr>
+                <a:t>Resulting Model</a:t>
+              </a:r>
+            </a:p>
+          </p:txBody>
+        </p:sp>
+        <p:cxnSp>
+          <p:nvCxnSpPr>
+            <p:cNvPr id="16" name="Straight Connector 15">
+              <a:extLst>
+                <a:ext uri="{FF2B5EF4-FFF2-40B4-BE49-F238E27FC236}">
+                  <a16:creationId xmlns:a16="http://schemas.microsoft.com/office/drawing/2014/main" id="{5F33F913-4FF6-1B4C-A70E-38C99C3A295E}"/>
+                </a:ext>
+              </a:extLst>
+            </p:cNvPr>
+            <p:cNvCxnSpPr>
+              <a:cxnSpLocks/>
+            </p:cNvCxnSpPr>
+            <p:nvPr/>
+          </p:nvCxnSpPr>
+          <p:spPr>
+            <a:xfrm>
+              <a:off x="444280" y="4340642"/>
+              <a:ext cx="2369556" cy="0"/>
+            </a:xfrm>
+            <a:prstGeom prst="line">
+              <a:avLst/>
+            </a:prstGeom>
+            <a:ln w="28575">
+              <a:solidFill>
+                <a:srgbClr val="03529B"/>
+              </a:solidFill>
+            </a:ln>
+          </p:spPr>
+          <p:style>
+            <a:lnRef idx="1">
+              <a:schemeClr val="accent1"/>
+            </a:lnRef>
+            <a:fillRef idx="0">
+              <a:schemeClr val="accent1"/>
+            </a:fillRef>
+            <a:effectRef idx="0">
+              <a:schemeClr val="accent1"/>
+            </a:effectRef>
+            <a:fontRef idx="minor">
+              <a:schemeClr val="tx1"/>
+            </a:fontRef>
+          </p:style>
+        </p:cxnSp>
+      </p:grpSp>
     </p:spTree>
     <p:extLst>
       <p:ext uri="{BB962C8B-B14F-4D97-AF65-F5344CB8AC3E}">
@@ -8435,8 +8553,8 @@
             </p:nvSpPr>
             <p:spPr>
               <a:xfrm>
-                <a:off x="460713" y="1158072"/>
-                <a:ext cx="6805231" cy="2585323"/>
+                <a:off x="460713" y="1743042"/>
+                <a:ext cx="6805231" cy="1477328"/>
               </a:xfrm>
               <a:prstGeom prst="rect">
                 <a:avLst/>
@@ -8449,40 +8567,23 @@
               </a:bodyPr>
               <a:lstStyle/>
               <a:p>
-                <a:pPr algn="l"/>
-                <a:r>
-                  <a:rPr lang="en-US" sz="2400" b="1" dirty="0">
-                    <a:latin typeface="Arial" panose="020B0604020202020204" pitchFamily="34" charset="0"/>
-                    <a:cs typeface="Arial" panose="020B0604020202020204" pitchFamily="34" charset="0"/>
-                  </a:rPr>
-                  <a:t>Testing stepwise model against…</a:t>
-                </a:r>
-              </a:p>
-              <a:p>
-                <a:pPr algn="l"/>
-                <a:endParaRPr lang="en-US" sz="2400" dirty="0">
-                  <a:latin typeface="Arial" panose="020B0604020202020204" pitchFamily="34" charset="0"/>
-                  <a:cs typeface="Arial" panose="020B0604020202020204" pitchFamily="34" charset="0"/>
-                </a:endParaRPr>
-              </a:p>
-              <a:p>
                 <a:pPr marL="342900" indent="-342900">
                   <a:buFont typeface="Arial" panose="020B0604020202020204" pitchFamily="34" charset="0"/>
                   <a:buChar char="•"/>
                 </a:pPr>
                 <a:r>
-                  <a:rPr lang="de-DE" sz="2400" dirty="0" err="1">
+                  <a:rPr lang="en-US" sz="2400" dirty="0">
                     <a:latin typeface="Arial" panose="020B0604020202020204" pitchFamily="34" charset="0"/>
                     <a:cs typeface="Arial" panose="020B0604020202020204" pitchFamily="34" charset="0"/>
                   </a:rPr>
-                  <a:t>Stepwise</a:t>
+                  <a:t>Stepwise </a:t>
                 </a:r>
                 <a:r>
                   <a:rPr lang="de-DE" sz="2400" dirty="0">
                     <a:latin typeface="Arial" panose="020B0604020202020204" pitchFamily="34" charset="0"/>
                     <a:cs typeface="Arial" panose="020B0604020202020204" pitchFamily="34" charset="0"/>
                   </a:rPr>
-                  <a:t> + </a:t>
+                  <a:t>+ </a:t>
                 </a:r>
                 <a14:m>
                   <m:oMath xmlns:m="http://schemas.openxmlformats.org/officeDocument/2006/math">
@@ -8689,16 +8790,6 @@
                   <a:cs typeface="Arial" panose="020B0604020202020204" pitchFamily="34" charset="0"/>
                 </a:endParaRPr>
               </a:p>
-              <a:p>
-                <a:pPr marL="342900" indent="-342900" algn="l">
-                  <a:buFont typeface="Arial" panose="020B0604020202020204" pitchFamily="34" charset="0"/>
-                  <a:buChar char="•"/>
-                </a:pPr>
-                <a:endParaRPr lang="en-US" sz="2400" i="1" dirty="0">
-                  <a:latin typeface="Arial" panose="020B0604020202020204" pitchFamily="34" charset="0"/>
-                  <a:cs typeface="Arial" panose="020B0604020202020204" pitchFamily="34" charset="0"/>
-                </a:endParaRPr>
-              </a:p>
             </p:txBody>
           </p:sp>
         </mc:Choice>
@@ -8719,8 +8810,8 @@
             </p:nvSpPr>
             <p:spPr>
               <a:xfrm>
-                <a:off x="460713" y="1158072"/>
-                <a:ext cx="6805231" cy="2585323"/>
+                <a:off x="460713" y="1743042"/>
+                <a:ext cx="6805231" cy="1477328"/>
               </a:xfrm>
               <a:prstGeom prst="rect">
                 <a:avLst/>
@@ -8728,7 +8819,7 @@
               <a:blipFill>
                 <a:blip r:embed="rId4"/>
                 <a:stretch>
-                  <a:fillRect l="-2793" t="-3922"/>
+                  <a:fillRect l="-2607" t="-6838" b="-11111"/>
                 </a:stretch>
               </a:blipFill>
             </p:spPr>
@@ -8993,6 +9084,112 @@
             </p:sp>
           </mc:Fallback>
         </mc:AlternateContent>
+      </p:grpSp>
+      <p:grpSp>
+        <p:nvGrpSpPr>
+          <p:cNvPr id="14" name="Group 13">
+            <a:extLst>
+              <a:ext uri="{FF2B5EF4-FFF2-40B4-BE49-F238E27FC236}">
+                <a16:creationId xmlns:a16="http://schemas.microsoft.com/office/drawing/2014/main" id="{BEF085C8-F0D9-3841-97E2-500F594D1202}"/>
+              </a:ext>
+            </a:extLst>
+          </p:cNvPr>
+          <p:cNvGrpSpPr/>
+          <p:nvPr/>
+        </p:nvGrpSpPr>
+        <p:grpSpPr>
+          <a:xfrm>
+            <a:off x="460713" y="1190730"/>
+            <a:ext cx="6283359" cy="1107996"/>
+            <a:chOff x="444280" y="3967614"/>
+            <a:chExt cx="2374048" cy="1107996"/>
+          </a:xfrm>
+        </p:grpSpPr>
+        <p:sp>
+          <p:nvSpPr>
+            <p:cNvPr id="15" name="TextBox 14">
+              <a:extLst>
+                <a:ext uri="{FF2B5EF4-FFF2-40B4-BE49-F238E27FC236}">
+                  <a16:creationId xmlns:a16="http://schemas.microsoft.com/office/drawing/2014/main" id="{5243601C-81D7-A64D-97D1-8BD4611C91FD}"/>
+                </a:ext>
+              </a:extLst>
+            </p:cNvPr>
+            <p:cNvSpPr txBox="1"/>
+            <p:nvPr/>
+          </p:nvSpPr>
+          <p:spPr>
+            <a:xfrm>
+              <a:off x="444280" y="3967614"/>
+              <a:ext cx="2374048" cy="1107996"/>
+            </a:xfrm>
+            <a:prstGeom prst="rect">
+              <a:avLst/>
+            </a:prstGeom>
+            <a:noFill/>
+          </p:spPr>
+          <p:txBody>
+            <a:bodyPr wrap="square" lIns="0" tIns="0" rIns="0" bIns="0" rtlCol="0">
+              <a:spAutoFit/>
+            </a:bodyPr>
+            <a:lstStyle/>
+            <a:p>
+              <a:pPr algn="l"/>
+              <a:r>
+                <a:rPr lang="en-US" sz="2400" b="1" dirty="0">
+                  <a:solidFill>
+                    <a:srgbClr val="03529B"/>
+                  </a:solidFill>
+                  <a:latin typeface="Arial" panose="020B0604020202020204" pitchFamily="34" charset="0"/>
+                  <a:cs typeface="Arial" panose="020B0604020202020204" pitchFamily="34" charset="0"/>
+                </a:rPr>
+                <a:t>Testing stepwise model against….</a:t>
+              </a:r>
+            </a:p>
+          </p:txBody>
+        </p:sp>
+        <p:cxnSp>
+          <p:nvCxnSpPr>
+            <p:cNvPr id="16" name="Straight Connector 15">
+              <a:extLst>
+                <a:ext uri="{FF2B5EF4-FFF2-40B4-BE49-F238E27FC236}">
+                  <a16:creationId xmlns:a16="http://schemas.microsoft.com/office/drawing/2014/main" id="{82B0F18A-584C-2040-9CDC-9D53933A6C9E}"/>
+                </a:ext>
+              </a:extLst>
+            </p:cNvPr>
+            <p:cNvCxnSpPr>
+              <a:cxnSpLocks/>
+            </p:cNvCxnSpPr>
+            <p:nvPr/>
+          </p:nvCxnSpPr>
+          <p:spPr>
+            <a:xfrm>
+              <a:off x="444280" y="4340642"/>
+              <a:ext cx="2374048" cy="0"/>
+            </a:xfrm>
+            <a:prstGeom prst="line">
+              <a:avLst/>
+            </a:prstGeom>
+            <a:ln w="28575">
+              <a:solidFill>
+                <a:srgbClr val="03529B"/>
+              </a:solidFill>
+            </a:ln>
+          </p:spPr>
+          <p:style>
+            <a:lnRef idx="1">
+              <a:schemeClr val="accent1"/>
+            </a:lnRef>
+            <a:fillRef idx="0">
+              <a:schemeClr val="accent1"/>
+            </a:fillRef>
+            <a:effectRef idx="0">
+              <a:schemeClr val="accent1"/>
+            </a:effectRef>
+            <a:fontRef idx="minor">
+              <a:schemeClr val="tx1"/>
+            </a:fontRef>
+          </p:style>
+        </p:cxnSp>
       </p:grpSp>
     </p:spTree>
     <p:extLst>
@@ -9336,66 +9533,6 @@
           </a:fontRef>
         </p:style>
       </p:cxnSp>
-      <p:pic>
-        <p:nvPicPr>
-          <p:cNvPr id="8" name="Picture 7" descr="Chart, line chart&#10;&#10;Description automatically generated">
-            <a:extLst>
-              <a:ext uri="{FF2B5EF4-FFF2-40B4-BE49-F238E27FC236}">
-                <a16:creationId xmlns:a16="http://schemas.microsoft.com/office/drawing/2014/main" id="{8CB800F0-FE5F-D948-AEB8-1567E0FE867D}"/>
-              </a:ext>
-            </a:extLst>
-          </p:cNvPr>
-          <p:cNvPicPr>
-            <a:picLocks noChangeAspect="1"/>
-          </p:cNvPicPr>
-          <p:nvPr/>
-        </p:nvPicPr>
-        <p:blipFill>
-          <a:blip r:embed="rId2"/>
-          <a:stretch>
-            <a:fillRect/>
-          </a:stretch>
-        </p:blipFill>
-        <p:spPr>
-          <a:xfrm>
-            <a:off x="460713" y="3854464"/>
-            <a:ext cx="4537978" cy="2646462"/>
-          </a:xfrm>
-          <a:prstGeom prst="rect">
-            <a:avLst/>
-          </a:prstGeom>
-        </p:spPr>
-      </p:pic>
-      <p:pic>
-        <p:nvPicPr>
-          <p:cNvPr id="10" name="Picture 9" descr="Chart, scatter chart&#10;&#10;Description automatically generated">
-            <a:extLst>
-              <a:ext uri="{FF2B5EF4-FFF2-40B4-BE49-F238E27FC236}">
-                <a16:creationId xmlns:a16="http://schemas.microsoft.com/office/drawing/2014/main" id="{DA1EB898-9293-C54B-9944-620A0EB7315B}"/>
-              </a:ext>
-            </a:extLst>
-          </p:cNvPr>
-          <p:cNvPicPr>
-            <a:picLocks noChangeAspect="1"/>
-          </p:cNvPicPr>
-          <p:nvPr/>
-        </p:nvPicPr>
-        <p:blipFill>
-          <a:blip r:embed="rId3"/>
-          <a:stretch>
-            <a:fillRect/>
-          </a:stretch>
-        </p:blipFill>
-        <p:spPr>
-          <a:xfrm>
-            <a:off x="460713" y="1073175"/>
-            <a:ext cx="4537978" cy="2646462"/>
-          </a:xfrm>
-          <a:prstGeom prst="rect">
-            <a:avLst/>
-          </a:prstGeom>
-        </p:spPr>
-      </p:pic>
       <p:grpSp>
         <p:nvGrpSpPr>
           <p:cNvPr id="15" name="Group 14">
@@ -9410,7 +9547,7 @@
         </p:nvGrpSpPr>
         <p:grpSpPr>
           <a:xfrm>
-            <a:off x="6390929" y="3935037"/>
+            <a:off x="6816080" y="3580226"/>
             <a:ext cx="4752528" cy="2646463"/>
             <a:chOff x="5879976" y="3818692"/>
             <a:chExt cx="5216707" cy="2802582"/>
@@ -9431,7 +9568,7 @@
             <p:nvPr/>
           </p:nvPicPr>
           <p:blipFill rotWithShape="1">
-            <a:blip r:embed="rId4"/>
+            <a:blip r:embed="rId2"/>
             <a:srcRect t="18160" r="6327" b="4690"/>
             <a:stretch/>
           </p:blipFill>
@@ -9488,6 +9625,159 @@
           </p:txBody>
         </p:sp>
       </p:grpSp>
+      <p:pic>
+        <p:nvPicPr>
+          <p:cNvPr id="22" name="Picture 21" descr="Chart, line chart&#10;&#10;Description automatically generated">
+            <a:extLst>
+              <a:ext uri="{FF2B5EF4-FFF2-40B4-BE49-F238E27FC236}">
+                <a16:creationId xmlns:a16="http://schemas.microsoft.com/office/drawing/2014/main" id="{D5980CAF-3B89-924E-BDE1-E1CC87F2B4C3}"/>
+              </a:ext>
+            </a:extLst>
+          </p:cNvPr>
+          <p:cNvPicPr>
+            <a:picLocks noChangeAspect="1"/>
+          </p:cNvPicPr>
+          <p:nvPr/>
+        </p:nvPicPr>
+        <p:blipFill>
+          <a:blip r:embed="rId3"/>
+          <a:stretch>
+            <a:fillRect/>
+          </a:stretch>
+        </p:blipFill>
+        <p:spPr>
+          <a:xfrm>
+            <a:off x="460713" y="3580226"/>
+            <a:ext cx="4537978" cy="2513342"/>
+          </a:xfrm>
+          <a:prstGeom prst="rect">
+            <a:avLst/>
+          </a:prstGeom>
+        </p:spPr>
+      </p:pic>
+      <p:pic>
+        <p:nvPicPr>
+          <p:cNvPr id="24" name="Picture 23" descr="Chart, scatter chart&#10;&#10;Description automatically generated">
+            <a:extLst>
+              <a:ext uri="{FF2B5EF4-FFF2-40B4-BE49-F238E27FC236}">
+                <a16:creationId xmlns:a16="http://schemas.microsoft.com/office/drawing/2014/main" id="{5A6D6F91-8026-B847-A225-95BE7BB19BB5}"/>
+              </a:ext>
+            </a:extLst>
+          </p:cNvPr>
+          <p:cNvPicPr>
+            <a:picLocks noChangeAspect="1"/>
+          </p:cNvPicPr>
+          <p:nvPr/>
+        </p:nvPicPr>
+        <p:blipFill>
+          <a:blip r:embed="rId4"/>
+          <a:stretch>
+            <a:fillRect/>
+          </a:stretch>
+        </p:blipFill>
+        <p:spPr>
+          <a:xfrm>
+            <a:off x="460713" y="1066884"/>
+            <a:ext cx="4537978" cy="2513342"/>
+          </a:xfrm>
+          <a:prstGeom prst="rect">
+            <a:avLst/>
+          </a:prstGeom>
+        </p:spPr>
+      </p:pic>
+      <p:pic>
+        <p:nvPicPr>
+          <p:cNvPr id="26" name="Picture 25" descr="Chart, scatter chart&#10;&#10;Description automatically generated">
+            <a:extLst>
+              <a:ext uri="{FF2B5EF4-FFF2-40B4-BE49-F238E27FC236}">
+                <a16:creationId xmlns:a16="http://schemas.microsoft.com/office/drawing/2014/main" id="{405CC8F7-5ADE-324A-B20A-AFF71A9DABF5}"/>
+              </a:ext>
+            </a:extLst>
+          </p:cNvPr>
+          <p:cNvPicPr>
+            <a:picLocks noChangeAspect="1"/>
+          </p:cNvPicPr>
+          <p:nvPr/>
+        </p:nvPicPr>
+        <p:blipFill>
+          <a:blip r:embed="rId5"/>
+          <a:stretch>
+            <a:fillRect/>
+          </a:stretch>
+        </p:blipFill>
+        <p:spPr>
+          <a:xfrm>
+            <a:off x="6816080" y="1066884"/>
+            <a:ext cx="4537978" cy="2513342"/>
+          </a:xfrm>
+          <a:prstGeom prst="rect">
+            <a:avLst/>
+          </a:prstGeom>
+        </p:spPr>
+      </p:pic>
+      <p:sp>
+        <p:nvSpPr>
+          <p:cNvPr id="27" name="Rectangle 26">
+            <a:extLst>
+              <a:ext uri="{FF2B5EF4-FFF2-40B4-BE49-F238E27FC236}">
+                <a16:creationId xmlns:a16="http://schemas.microsoft.com/office/drawing/2014/main" id="{279F64A4-B22C-F844-9B28-030CF67CDB50}"/>
+              </a:ext>
+            </a:extLst>
+          </p:cNvPr>
+          <p:cNvSpPr/>
+          <p:nvPr/>
+        </p:nvSpPr>
+        <p:spPr>
+          <a:xfrm>
+            <a:off x="3647369" y="6149753"/>
+            <a:ext cx="4897263" cy="365125"/>
+          </a:xfrm>
+          <a:prstGeom prst="rect">
+            <a:avLst/>
+          </a:prstGeom>
+          <a:solidFill>
+            <a:schemeClr val="bg1">
+              <a:lumMod val="95000"/>
+            </a:schemeClr>
+          </a:solidFill>
+          <a:ln w="28575">
+            <a:noFill/>
+          </a:ln>
+        </p:spPr>
+        <p:style>
+          <a:lnRef idx="2">
+            <a:schemeClr val="accent1">
+              <a:shade val="50000"/>
+            </a:schemeClr>
+          </a:lnRef>
+          <a:fillRef idx="1">
+            <a:schemeClr val="accent1"/>
+          </a:fillRef>
+          <a:effectRef idx="0">
+            <a:schemeClr val="accent1"/>
+          </a:effectRef>
+          <a:fontRef idx="minor">
+            <a:schemeClr val="lt1"/>
+          </a:fontRef>
+        </p:style>
+        <p:txBody>
+          <a:bodyPr rtlCol="0" anchor="ctr"/>
+          <a:lstStyle/>
+          <a:p>
+            <a:pPr algn="ctr"/>
+            <a:r>
+              <a:rPr lang="en-US" sz="2000" dirty="0">
+                <a:solidFill>
+                  <a:schemeClr val="tx1"/>
+                </a:solidFill>
+                <a:latin typeface="Arial" panose="020B0604020202020204" pitchFamily="34" charset="0"/>
+                <a:cs typeface="Arial" panose="020B0604020202020204" pitchFamily="34" charset="0"/>
+              </a:rPr>
+              <a:t>No major assumption violations</a:t>
+            </a:r>
+          </a:p>
+        </p:txBody>
+      </p:sp>
     </p:spTree>
     <p:extLst>
       <p:ext uri="{BB962C8B-B14F-4D97-AF65-F5344CB8AC3E}">
@@ -9650,8 +9940,38 @@
         </p:blipFill>
         <p:spPr>
           <a:xfrm>
-            <a:off x="460713" y="1546991"/>
+            <a:off x="5556607" y="1124744"/>
             <a:ext cx="6174680" cy="1882009"/>
+          </a:xfrm>
+          <a:prstGeom prst="rect">
+            <a:avLst/>
+          </a:prstGeom>
+        </p:spPr>
+      </p:pic>
+      <p:pic>
+        <p:nvPicPr>
+          <p:cNvPr id="10" name="Picture 9" descr="Chart, line chart&#10;&#10;Description automatically generated">
+            <a:extLst>
+              <a:ext uri="{FF2B5EF4-FFF2-40B4-BE49-F238E27FC236}">
+                <a16:creationId xmlns:a16="http://schemas.microsoft.com/office/drawing/2014/main" id="{1FB34245-67B5-EF48-8ABD-5C3CE9425A98}"/>
+              </a:ext>
+            </a:extLst>
+          </p:cNvPr>
+          <p:cNvPicPr>
+            <a:picLocks noChangeAspect="1"/>
+          </p:cNvPicPr>
+          <p:nvPr/>
+        </p:nvPicPr>
+        <p:blipFill>
+          <a:blip r:embed="rId3"/>
+          <a:stretch>
+            <a:fillRect/>
+          </a:stretch>
+        </p:blipFill>
+        <p:spPr>
+          <a:xfrm>
+            <a:off x="5556607" y="3092938"/>
+            <a:ext cx="5743290" cy="3445974"/>
           </a:xfrm>
           <a:prstGeom prst="rect">
             <a:avLst/>

</xml_diff>

<commit_message>
slide + predplot update
</commit_message>
<xml_diff>
--- a/Presentation/slide_deck.pptx
+++ b/Presentation/slide_deck.pptx
@@ -207,7 +207,7 @@
           <a:p>
             <a:fld id="{3398E8B9-81F1-424D-AE77-F968A2DCD636}" type="datetimeFigureOut">
               <a:rPr lang="en-US" smtClean="0"/>
-              <a:t>9/28/21</a:t>
+              <a:t>9/29/21</a:t>
             </a:fld>
             <a:endParaRPr lang="en-US"/>
           </a:p>
@@ -475,6 +475,407 @@
 </p:notesMaster>
 </file>
 
+<file path=ppt/notesSlides/notesSlide1.xml><?xml version="1.0" encoding="utf-8"?>
+<p:notes xmlns:a="http://schemas.openxmlformats.org/drawingml/2006/main" xmlns:r="http://schemas.openxmlformats.org/officeDocument/2006/relationships" xmlns:p="http://schemas.openxmlformats.org/presentationml/2006/main">
+  <p:cSld>
+    <p:spTree>
+      <p:nvGrpSpPr>
+        <p:cNvPr id="1" name=""/>
+        <p:cNvGrpSpPr/>
+        <p:nvPr/>
+      </p:nvGrpSpPr>
+      <p:grpSpPr>
+        <a:xfrm>
+          <a:off x="0" y="0"/>
+          <a:ext cx="0" cy="0"/>
+          <a:chOff x="0" y="0"/>
+          <a:chExt cx="0" cy="0"/>
+        </a:xfrm>
+      </p:grpSpPr>
+      <p:sp>
+        <p:nvSpPr>
+          <p:cNvPr id="2" name="Slide Image Placeholder 1"/>
+          <p:cNvSpPr>
+            <a:spLocks noGrp="1" noRot="1" noChangeAspect="1"/>
+          </p:cNvSpPr>
+          <p:nvPr>
+            <p:ph type="sldImg"/>
+          </p:nvPr>
+        </p:nvSpPr>
+        <p:spPr/>
+      </p:sp>
+      <p:sp>
+        <p:nvSpPr>
+          <p:cNvPr id="3" name="Notes Placeholder 2"/>
+          <p:cNvSpPr>
+            <a:spLocks noGrp="1"/>
+          </p:cNvSpPr>
+          <p:nvPr>
+            <p:ph type="body" idx="1"/>
+          </p:nvPr>
+        </p:nvSpPr>
+        <p:spPr/>
+        <p:txBody>
+          <a:bodyPr/>
+          <a:lstStyle/>
+          <a:p>
+            <a:r>
+              <a:rPr lang="en-US" dirty="0" err="1"/>
+              <a:t>Dauren</a:t>
+            </a:r>
+            <a:endParaRPr lang="en-US" dirty="0"/>
+          </a:p>
+          <a:p>
+            <a:endParaRPr lang="en-US" dirty="0"/>
+          </a:p>
+        </p:txBody>
+      </p:sp>
+      <p:sp>
+        <p:nvSpPr>
+          <p:cNvPr id="4" name="Slide Number Placeholder 3"/>
+          <p:cNvSpPr>
+            <a:spLocks noGrp="1"/>
+          </p:cNvSpPr>
+          <p:nvPr>
+            <p:ph type="sldNum" sz="quarter" idx="5"/>
+          </p:nvPr>
+        </p:nvSpPr>
+        <p:spPr/>
+        <p:txBody>
+          <a:bodyPr/>
+          <a:lstStyle/>
+          <a:p>
+            <a:fld id="{F5134806-D19D-A540-9B0B-614DC5FE67CD}" type="slidenum">
+              <a:rPr lang="en-US" smtClean="0"/>
+              <a:t>6</a:t>
+            </a:fld>
+            <a:endParaRPr lang="en-US"/>
+          </a:p>
+        </p:txBody>
+      </p:sp>
+    </p:spTree>
+    <p:extLst>
+      <p:ext uri="{BB962C8B-B14F-4D97-AF65-F5344CB8AC3E}">
+        <p14:creationId xmlns:p14="http://schemas.microsoft.com/office/powerpoint/2010/main" val="122966419"/>
+      </p:ext>
+    </p:extLst>
+  </p:cSld>
+  <p:clrMapOvr>
+    <a:masterClrMapping/>
+  </p:clrMapOvr>
+</p:notes>
+</file>
+
+<file path=ppt/notesSlides/notesSlide2.xml><?xml version="1.0" encoding="utf-8"?>
+<p:notes xmlns:a="http://schemas.openxmlformats.org/drawingml/2006/main" xmlns:r="http://schemas.openxmlformats.org/officeDocument/2006/relationships" xmlns:p="http://schemas.openxmlformats.org/presentationml/2006/main">
+  <p:cSld>
+    <p:spTree>
+      <p:nvGrpSpPr>
+        <p:cNvPr id="1" name=""/>
+        <p:cNvGrpSpPr/>
+        <p:nvPr/>
+      </p:nvGrpSpPr>
+      <p:grpSpPr>
+        <a:xfrm>
+          <a:off x="0" y="0"/>
+          <a:ext cx="0" cy="0"/>
+          <a:chOff x="0" y="0"/>
+          <a:chExt cx="0" cy="0"/>
+        </a:xfrm>
+      </p:grpSpPr>
+      <p:sp>
+        <p:nvSpPr>
+          <p:cNvPr id="2" name="Slide Image Placeholder 1"/>
+          <p:cNvSpPr>
+            <a:spLocks noGrp="1" noRot="1" noChangeAspect="1"/>
+          </p:cNvSpPr>
+          <p:nvPr>
+            <p:ph type="sldImg"/>
+          </p:nvPr>
+        </p:nvSpPr>
+        <p:spPr/>
+      </p:sp>
+      <p:sp>
+        <p:nvSpPr>
+          <p:cNvPr id="3" name="Notes Placeholder 2"/>
+          <p:cNvSpPr>
+            <a:spLocks noGrp="1"/>
+          </p:cNvSpPr>
+          <p:nvPr>
+            <p:ph type="body" idx="1"/>
+          </p:nvPr>
+        </p:nvSpPr>
+        <p:spPr/>
+        <p:txBody>
+          <a:bodyPr/>
+          <a:lstStyle/>
+          <a:p>
+            <a:r>
+              <a:rPr lang="en-US" dirty="0" err="1"/>
+              <a:t>Himangshu</a:t>
+            </a:r>
+            <a:endParaRPr lang="en-US" dirty="0"/>
+          </a:p>
+        </p:txBody>
+      </p:sp>
+      <p:sp>
+        <p:nvSpPr>
+          <p:cNvPr id="4" name="Slide Number Placeholder 3"/>
+          <p:cNvSpPr>
+            <a:spLocks noGrp="1"/>
+          </p:cNvSpPr>
+          <p:nvPr>
+            <p:ph type="sldNum" sz="quarter" idx="5"/>
+          </p:nvPr>
+        </p:nvSpPr>
+        <p:spPr/>
+        <p:txBody>
+          <a:bodyPr/>
+          <a:lstStyle/>
+          <a:p>
+            <a:fld id="{F5134806-D19D-A540-9B0B-614DC5FE67CD}" type="slidenum">
+              <a:rPr lang="en-US" smtClean="0"/>
+              <a:t>7</a:t>
+            </a:fld>
+            <a:endParaRPr lang="en-US"/>
+          </a:p>
+        </p:txBody>
+      </p:sp>
+    </p:spTree>
+    <p:extLst>
+      <p:ext uri="{BB962C8B-B14F-4D97-AF65-F5344CB8AC3E}">
+        <p14:creationId xmlns:p14="http://schemas.microsoft.com/office/powerpoint/2010/main" val="553754786"/>
+      </p:ext>
+    </p:extLst>
+  </p:cSld>
+  <p:clrMapOvr>
+    <a:masterClrMapping/>
+  </p:clrMapOvr>
+</p:notes>
+</file>
+
+<file path=ppt/notesSlides/notesSlide3.xml><?xml version="1.0" encoding="utf-8"?>
+<p:notes xmlns:a="http://schemas.openxmlformats.org/drawingml/2006/main" xmlns:r="http://schemas.openxmlformats.org/officeDocument/2006/relationships" xmlns:p="http://schemas.openxmlformats.org/presentationml/2006/main">
+  <p:cSld>
+    <p:spTree>
+      <p:nvGrpSpPr>
+        <p:cNvPr id="1" name=""/>
+        <p:cNvGrpSpPr/>
+        <p:nvPr/>
+      </p:nvGrpSpPr>
+      <p:grpSpPr>
+        <a:xfrm>
+          <a:off x="0" y="0"/>
+          <a:ext cx="0" cy="0"/>
+          <a:chOff x="0" y="0"/>
+          <a:chExt cx="0" cy="0"/>
+        </a:xfrm>
+      </p:grpSpPr>
+      <p:sp>
+        <p:nvSpPr>
+          <p:cNvPr id="2" name="Slide Image Placeholder 1"/>
+          <p:cNvSpPr>
+            <a:spLocks noGrp="1" noRot="1" noChangeAspect="1"/>
+          </p:cNvSpPr>
+          <p:nvPr>
+            <p:ph type="sldImg"/>
+          </p:nvPr>
+        </p:nvSpPr>
+        <p:spPr/>
+      </p:sp>
+      <p:sp>
+        <p:nvSpPr>
+          <p:cNvPr id="3" name="Notes Placeholder 2"/>
+          <p:cNvSpPr>
+            <a:spLocks noGrp="1"/>
+          </p:cNvSpPr>
+          <p:nvPr>
+            <p:ph type="body" idx="1"/>
+          </p:nvPr>
+        </p:nvSpPr>
+        <p:spPr/>
+        <p:txBody>
+          <a:bodyPr/>
+          <a:lstStyle/>
+          <a:p>
+            <a:r>
+              <a:rPr lang="en-US" dirty="0" err="1"/>
+              <a:t>Himangshu</a:t>
+            </a:r>
+            <a:endParaRPr lang="en-US" dirty="0"/>
+          </a:p>
+          <a:p>
+            <a:pPr marL="171450" indent="-171450">
+              <a:buFontTx/>
+              <a:buChar char="-"/>
+            </a:pPr>
+            <a:r>
+              <a:rPr lang="en-US" dirty="0"/>
+              <a:t>Equal variance and independence FINE (Plot 1)</a:t>
+            </a:r>
+          </a:p>
+          <a:p>
+            <a:pPr marL="171450" indent="-171450">
+              <a:buFontTx/>
+              <a:buChar char="-"/>
+            </a:pPr>
+            <a:r>
+              <a:rPr lang="en-US" dirty="0"/>
+              <a:t>Linearity FINE (Plot 2)</a:t>
+            </a:r>
+          </a:p>
+          <a:p>
+            <a:pPr marL="171450" indent="-171450">
+              <a:buFontTx/>
+              <a:buChar char="-"/>
+            </a:pPr>
+            <a:r>
+              <a:rPr lang="en-US" dirty="0"/>
+              <a:t>Normality FINE (Plot 3)</a:t>
+            </a:r>
+          </a:p>
+          <a:p>
+            <a:pPr marL="171450" indent="-171450">
+              <a:buFontTx/>
+              <a:buChar char="-"/>
+            </a:pPr>
+            <a:endParaRPr lang="en-US" dirty="0"/>
+          </a:p>
+          <a:p>
+            <a:pPr marL="0" indent="0">
+              <a:buFontTx/>
+              <a:buNone/>
+            </a:pPr>
+            <a:r>
+              <a:rPr lang="en-US" dirty="0"/>
+              <a:t>One outlier, but: non-influential</a:t>
+            </a:r>
+          </a:p>
+        </p:txBody>
+      </p:sp>
+      <p:sp>
+        <p:nvSpPr>
+          <p:cNvPr id="4" name="Slide Number Placeholder 3"/>
+          <p:cNvSpPr>
+            <a:spLocks noGrp="1"/>
+          </p:cNvSpPr>
+          <p:nvPr>
+            <p:ph type="sldNum" sz="quarter" idx="5"/>
+          </p:nvPr>
+        </p:nvSpPr>
+        <p:spPr/>
+        <p:txBody>
+          <a:bodyPr/>
+          <a:lstStyle/>
+          <a:p>
+            <a:fld id="{F5134806-D19D-A540-9B0B-614DC5FE67CD}" type="slidenum">
+              <a:rPr lang="en-US" smtClean="0"/>
+              <a:t>8</a:t>
+            </a:fld>
+            <a:endParaRPr lang="en-US"/>
+          </a:p>
+        </p:txBody>
+      </p:sp>
+    </p:spTree>
+    <p:extLst>
+      <p:ext uri="{BB962C8B-B14F-4D97-AF65-F5344CB8AC3E}">
+        <p14:creationId xmlns:p14="http://schemas.microsoft.com/office/powerpoint/2010/main" val="638928056"/>
+      </p:ext>
+    </p:extLst>
+  </p:cSld>
+  <p:clrMapOvr>
+    <a:masterClrMapping/>
+  </p:clrMapOvr>
+</p:notes>
+</file>
+
+<file path=ppt/notesSlides/notesSlide4.xml><?xml version="1.0" encoding="utf-8"?>
+<p:notes xmlns:a="http://schemas.openxmlformats.org/drawingml/2006/main" xmlns:r="http://schemas.openxmlformats.org/officeDocument/2006/relationships" xmlns:p="http://schemas.openxmlformats.org/presentationml/2006/main">
+  <p:cSld>
+    <p:spTree>
+      <p:nvGrpSpPr>
+        <p:cNvPr id="1" name=""/>
+        <p:cNvGrpSpPr/>
+        <p:nvPr/>
+      </p:nvGrpSpPr>
+      <p:grpSpPr>
+        <a:xfrm>
+          <a:off x="0" y="0"/>
+          <a:ext cx="0" cy="0"/>
+          <a:chOff x="0" y="0"/>
+          <a:chExt cx="0" cy="0"/>
+        </a:xfrm>
+      </p:grpSpPr>
+      <p:sp>
+        <p:nvSpPr>
+          <p:cNvPr id="2" name="Slide Image Placeholder 1"/>
+          <p:cNvSpPr>
+            <a:spLocks noGrp="1" noRot="1" noChangeAspect="1"/>
+          </p:cNvSpPr>
+          <p:nvPr>
+            <p:ph type="sldImg"/>
+          </p:nvPr>
+        </p:nvSpPr>
+        <p:spPr/>
+      </p:sp>
+      <p:sp>
+        <p:nvSpPr>
+          <p:cNvPr id="3" name="Notes Placeholder 2"/>
+          <p:cNvSpPr>
+            <a:spLocks noGrp="1"/>
+          </p:cNvSpPr>
+          <p:nvPr>
+            <p:ph type="body" idx="1"/>
+          </p:nvPr>
+        </p:nvSpPr>
+        <p:spPr/>
+        <p:txBody>
+          <a:bodyPr/>
+          <a:lstStyle/>
+          <a:p>
+            <a:r>
+              <a:rPr lang="en-US" dirty="0"/>
+              <a:t>Moritz</a:t>
+            </a:r>
+          </a:p>
+        </p:txBody>
+      </p:sp>
+      <p:sp>
+        <p:nvSpPr>
+          <p:cNvPr id="4" name="Slide Number Placeholder 3"/>
+          <p:cNvSpPr>
+            <a:spLocks noGrp="1"/>
+          </p:cNvSpPr>
+          <p:nvPr>
+            <p:ph type="sldNum" sz="quarter" idx="5"/>
+          </p:nvPr>
+        </p:nvSpPr>
+        <p:spPr/>
+        <p:txBody>
+          <a:bodyPr/>
+          <a:lstStyle/>
+          <a:p>
+            <a:fld id="{F5134806-D19D-A540-9B0B-614DC5FE67CD}" type="slidenum">
+              <a:rPr lang="en-US" smtClean="0"/>
+              <a:t>9</a:t>
+            </a:fld>
+            <a:endParaRPr lang="en-US"/>
+          </a:p>
+        </p:txBody>
+      </p:sp>
+    </p:spTree>
+    <p:extLst>
+      <p:ext uri="{BB962C8B-B14F-4D97-AF65-F5344CB8AC3E}">
+        <p14:creationId xmlns:p14="http://schemas.microsoft.com/office/powerpoint/2010/main" val="1254124116"/>
+      </p:ext>
+    </p:extLst>
+  </p:cSld>
+  <p:clrMapOvr>
+    <a:masterClrMapping/>
+  </p:clrMapOvr>
+</p:notes>
+</file>
+
 <file path=ppt/slideLayouts/slideLayout1.xml><?xml version="1.0" encoding="utf-8"?>
 <p:sldLayout xmlns:a="http://schemas.openxmlformats.org/drawingml/2006/main" xmlns:r="http://schemas.openxmlformats.org/officeDocument/2006/relationships" xmlns:p="http://schemas.openxmlformats.org/presentationml/2006/main" type="title" preserve="1">
   <p:cSld name="Title Slide">
@@ -624,7 +1025,7 @@
           <a:p>
             <a:fld id="{D7919F00-95C3-E345-9A68-6806DD4786C7}" type="datetime1">
               <a:rPr lang="de-DE" smtClean="0"/>
-              <a:t>28.09.21</a:t>
+              <a:t>29.09.21</a:t>
             </a:fld>
             <a:endParaRPr lang="en-US"/>
           </a:p>
@@ -824,7 +1225,7 @@
           <a:p>
             <a:fld id="{EEF8CF17-46D6-4746-9F83-62838F7FFA9E}" type="datetime1">
               <a:rPr lang="de-DE" smtClean="0"/>
-              <a:t>28.09.21</a:t>
+              <a:t>29.09.21</a:t>
             </a:fld>
             <a:endParaRPr lang="en-US"/>
           </a:p>
@@ -1034,7 +1435,7 @@
           <a:p>
             <a:fld id="{846669D5-C56A-D444-8228-920498C21CB5}" type="datetime1">
               <a:rPr lang="de-DE" smtClean="0"/>
-              <a:t>28.09.21</a:t>
+              <a:t>29.09.21</a:t>
             </a:fld>
             <a:endParaRPr lang="en-US"/>
           </a:p>
@@ -1234,7 +1635,7 @@
           <a:p>
             <a:fld id="{6B2A11E0-3F60-484C-B31C-C335BE773633}" type="datetime1">
               <a:rPr lang="de-DE" smtClean="0"/>
-              <a:t>28.09.21</a:t>
+              <a:t>29.09.21</a:t>
             </a:fld>
             <a:endParaRPr lang="en-US"/>
           </a:p>
@@ -1510,7 +1911,7 @@
           <a:p>
             <a:fld id="{AD0CF0BE-8C02-7A46-B8F9-9A1A359A3221}" type="datetime1">
               <a:rPr lang="de-DE" smtClean="0"/>
-              <a:t>28.09.21</a:t>
+              <a:t>29.09.21</a:t>
             </a:fld>
             <a:endParaRPr lang="en-US"/>
           </a:p>
@@ -1778,7 +2179,7 @@
           <a:p>
             <a:fld id="{E3D55EAB-06EA-2B41-8799-9D715C6BB5C9}" type="datetime1">
               <a:rPr lang="de-DE" smtClean="0"/>
-              <a:t>28.09.21</a:t>
+              <a:t>29.09.21</a:t>
             </a:fld>
             <a:endParaRPr lang="en-US"/>
           </a:p>
@@ -2193,7 +2594,7 @@
           <a:p>
             <a:fld id="{899C43E9-79E3-0343-886E-B54191E8154C}" type="datetime1">
               <a:rPr lang="de-DE" smtClean="0"/>
-              <a:t>28.09.21</a:t>
+              <a:t>29.09.21</a:t>
             </a:fld>
             <a:endParaRPr lang="en-US"/>
           </a:p>
@@ -2335,7 +2736,7 @@
           <a:p>
             <a:fld id="{38D1FDF0-7FAD-B74F-9C14-35E95702474C}" type="datetime1">
               <a:rPr lang="de-DE" smtClean="0"/>
-              <a:t>28.09.21</a:t>
+              <a:t>29.09.21</a:t>
             </a:fld>
             <a:endParaRPr lang="en-US"/>
           </a:p>
@@ -2448,7 +2849,7 @@
           <a:p>
             <a:fld id="{40CA08E2-633C-6F4C-B416-7B24EADBD5D5}" type="datetime1">
               <a:rPr lang="de-DE" smtClean="0"/>
-              <a:t>28.09.21</a:t>
+              <a:t>29.09.21</a:t>
             </a:fld>
             <a:endParaRPr lang="en-US"/>
           </a:p>
@@ -2766,7 +3167,7 @@
           <a:p>
             <a:fld id="{25A8823F-BF39-4B48-92AC-7573D6900421}" type="datetime1">
               <a:rPr lang="de-DE" smtClean="0"/>
-              <a:t>28.09.21</a:t>
+              <a:t>29.09.21</a:t>
             </a:fld>
             <a:endParaRPr lang="en-US"/>
           </a:p>
@@ -3059,7 +3460,7 @@
           <a:p>
             <a:fld id="{9133BCCA-5C2C-1E48-9D3E-EC5297EB8560}" type="datetime1">
               <a:rPr lang="de-DE" smtClean="0"/>
-              <a:t>28.09.21</a:t>
+              <a:t>29.09.21</a:t>
             </a:fld>
             <a:endParaRPr lang="en-US"/>
           </a:p>
@@ -3311,7 +3712,7 @@
           <a:p>
             <a:fld id="{4ECDE09A-B1E7-BF49-A4A8-79F389F3B4B8}" type="datetime1">
               <a:rPr lang="de-DE" smtClean="0"/>
-              <a:t>28.09.21</a:t>
+              <a:t>29.09.21</a:t>
             </a:fld>
             <a:endParaRPr lang="en-US"/>
           </a:p>
@@ -5388,7 +5789,7 @@
         <p:spPr>
           <a:xfrm>
             <a:off x="460713" y="1690351"/>
-            <a:ext cx="11253806" cy="1477328"/>
+            <a:ext cx="11253806" cy="1846659"/>
           </a:xfrm>
           <a:prstGeom prst="rect">
             <a:avLst/>
@@ -5450,6 +5851,19 @@
                 <a:cs typeface="Arial" panose="020B0604020202020204" pitchFamily="34" charset="0"/>
               </a:rPr>
               <a:t>Only male participants</a:t>
+            </a:r>
+          </a:p>
+          <a:p>
+            <a:pPr marL="342900" indent="-342900" algn="l">
+              <a:buFont typeface="Arial" panose="020B0604020202020204" pitchFamily="34" charset="0"/>
+              <a:buChar char="•"/>
+            </a:pPr>
+            <a:r>
+              <a:rPr lang="en-US" sz="2400" dirty="0">
+                <a:latin typeface="Arial" panose="020B0604020202020204" pitchFamily="34" charset="0"/>
+                <a:cs typeface="Arial" panose="020B0604020202020204" pitchFamily="34" charset="0"/>
+              </a:rPr>
+              <a:t>Paid participation</a:t>
             </a:r>
           </a:p>
         </p:txBody>
@@ -6456,6 +6870,51 @@
                       </p:childTnLst>
                     </p:cTn>
                   </p:par>
+                  <p:par>
+                    <p:cTn id="13" fill="hold">
+                      <p:stCondLst>
+                        <p:cond delay="indefinite"/>
+                      </p:stCondLst>
+                      <p:childTnLst>
+                        <p:par>
+                          <p:cTn id="14" fill="hold">
+                            <p:stCondLst>
+                              <p:cond delay="0"/>
+                            </p:stCondLst>
+                            <p:childTnLst>
+                              <p:par>
+                                <p:cTn id="15" presetID="1" presetClass="entr" presetSubtype="0" fill="hold" grpId="0" nodeType="clickEffect">
+                                  <p:stCondLst>
+                                    <p:cond delay="0"/>
+                                  </p:stCondLst>
+                                  <p:childTnLst>
+                                    <p:set>
+                                      <p:cBhvr>
+                                        <p:cTn id="16" dur="1" fill="hold">
+                                          <p:stCondLst>
+                                            <p:cond delay="0"/>
+                                          </p:stCondLst>
+                                        </p:cTn>
+                                        <p:tgtEl>
+                                          <p:spTgt spid="24"/>
+                                        </p:tgtEl>
+                                        <p:attrNameLst>
+                                          <p:attrName>style.visibility</p:attrName>
+                                        </p:attrNameLst>
+                                      </p:cBhvr>
+                                      <p:to>
+                                        <p:strVal val="visible"/>
+                                      </p:to>
+                                    </p:set>
+                                  </p:childTnLst>
+                                </p:cTn>
+                              </p:par>
+                            </p:childTnLst>
+                          </p:cTn>
+                        </p:par>
+                      </p:childTnLst>
+                    </p:cTn>
+                  </p:par>
                 </p:childTnLst>
               </p:cTn>
               <p:prevCondLst>
@@ -6478,6 +6937,7 @@
       </p:par>
     </p:tnLst>
     <p:bldLst>
+      <p:bldP spid="24" grpId="0" animBg="1"/>
       <p:bldP spid="13" grpId="0" animBg="1"/>
     </p:bldLst>
   </p:timing>
@@ -6862,8 +7322,8 @@
           </a:prstGeom>
         </p:spPr>
       </p:pic>
-      <mc:AlternateContent xmlns:mc="http://schemas.openxmlformats.org/markup-compatibility/2006">
-        <mc:Choice xmlns:a14="http://schemas.microsoft.com/office/drawing/2010/main" Requires="a14">
+      <mc:AlternateContent xmlns:mc="http://schemas.openxmlformats.org/markup-compatibility/2006" xmlns:a14="http://schemas.microsoft.com/office/drawing/2010/main">
+        <mc:Choice Requires="a14">
           <p:sp>
             <p:nvSpPr>
               <p:cNvPr id="24" name="Rectangle 23">
@@ -7006,7 +7466,7 @@
             </p:txBody>
           </p:sp>
         </mc:Choice>
-        <mc:Fallback>
+        <mc:Fallback xmlns="">
           <p:sp>
             <p:nvSpPr>
               <p:cNvPr id="24" name="Rectangle 23">
@@ -7646,8 +8106,8 @@
           </p:style>
         </p:cxnSp>
       </p:grpSp>
-      <mc:AlternateContent xmlns:mc="http://schemas.openxmlformats.org/markup-compatibility/2006">
-        <mc:Choice xmlns:a14="http://schemas.microsoft.com/office/drawing/2010/main" Requires="a14">
+      <mc:AlternateContent xmlns:mc="http://schemas.openxmlformats.org/markup-compatibility/2006" xmlns:a14="http://schemas.microsoft.com/office/drawing/2010/main">
+        <mc:Choice Requires="a14">
           <p:sp>
             <p:nvSpPr>
               <p:cNvPr id="22" name="TextBox 21">
@@ -7948,7 +8408,7 @@
             </p:txBody>
           </p:sp>
         </mc:Choice>
-        <mc:Fallback>
+        <mc:Fallback xmlns="">
           <p:sp>
             <p:nvSpPr>
               <p:cNvPr id="22" name="TextBox 21">
@@ -7972,7 +8432,7 @@
                 <a:avLst/>
               </a:prstGeom>
               <a:blipFill>
-                <a:blip r:embed="rId2"/>
+                <a:blip r:embed="rId3"/>
                 <a:stretch>
                   <a:fillRect l="-418" t="-22581" r="-418" b="-35484"/>
                 </a:stretch>
@@ -8008,7 +8468,7 @@
           <p:nvPr/>
         </p:nvPicPr>
         <p:blipFill>
-          <a:blip r:embed="rId3"/>
+          <a:blip r:embed="rId4"/>
           <a:stretch>
             <a:fillRect/>
           </a:stretch>
@@ -8304,7 +8764,7 @@
             <p:nvPr/>
           </p:nvPicPr>
           <p:blipFill>
-            <a:blip r:embed="rId2">
+            <a:blip r:embed="rId3">
               <a:extLst>
                 <a:ext uri="{28A0092B-C50C-407E-A947-70E740481C1C}">
                   <a14:useLocalDpi xmlns:a14="http://schemas.microsoft.com/office/drawing/2010/main" val="0"/>
@@ -8353,7 +8813,7 @@
               <p:spPr>
                 <a:xfrm>
                   <a:off x="7517350" y="1988846"/>
-                  <a:ext cx="1368152" cy="969496"/>
+                  <a:ext cx="1386962" cy="969496"/>
                 </a:xfrm>
                 <a:prstGeom prst="rect">
                   <a:avLst/>
@@ -8509,15 +8969,15 @@
               <p:spPr>
                 <a:xfrm>
                   <a:off x="7517350" y="1988846"/>
-                  <a:ext cx="1368152" cy="969496"/>
+                  <a:ext cx="1386962" cy="969496"/>
                 </a:xfrm>
                 <a:prstGeom prst="rect">
                   <a:avLst/>
                 </a:prstGeom>
                 <a:blipFill>
-                  <a:blip r:embed="rId3"/>
+                  <a:blip r:embed="rId4"/>
                   <a:stretch>
-                    <a:fillRect l="-917" r="-1835" b="-5195"/>
+                    <a:fillRect r="-901" b="-5195"/>
                   </a:stretch>
                 </a:blipFill>
               </p:spPr>
@@ -8566,69 +9026,6 @@
                 <a:spAutoFit/>
               </a:bodyPr>
               <a:lstStyle/>
-              <a:p>
-                <a:pPr marL="342900" indent="-342900">
-                  <a:buFont typeface="Arial" panose="020B0604020202020204" pitchFamily="34" charset="0"/>
-                  <a:buChar char="•"/>
-                </a:pPr>
-                <a:r>
-                  <a:rPr lang="en-US" sz="2400" dirty="0">
-                    <a:latin typeface="Arial" panose="020B0604020202020204" pitchFamily="34" charset="0"/>
-                    <a:cs typeface="Arial" panose="020B0604020202020204" pitchFamily="34" charset="0"/>
-                  </a:rPr>
-                  <a:t>Stepwise </a:t>
-                </a:r>
-                <a:r>
-                  <a:rPr lang="de-DE" sz="2400" dirty="0">
-                    <a:latin typeface="Arial" panose="020B0604020202020204" pitchFamily="34" charset="0"/>
-                    <a:cs typeface="Arial" panose="020B0604020202020204" pitchFamily="34" charset="0"/>
-                  </a:rPr>
-                  <a:t>+ </a:t>
-                </a:r>
-                <a14:m>
-                  <m:oMath xmlns:m="http://schemas.openxmlformats.org/officeDocument/2006/math">
-                    <m:r>
-                      <a:rPr lang="de-DE" sz="2400" i="1">
-                        <a:latin typeface="Cambria Math" panose="02040503050406030204" pitchFamily="18" charset="0"/>
-                        <a:cs typeface="Arial" panose="020B0604020202020204" pitchFamily="34" charset="0"/>
-                      </a:rPr>
-                      <m:t>𝑡𝑟𝑒𝑎𝑡</m:t>
-                    </m:r>
-                    <m:r>
-                      <a:rPr lang="de-DE" sz="2400" b="0" i="1" smtClean="0">
-                        <a:latin typeface="Cambria Math" panose="02040503050406030204" pitchFamily="18" charset="0"/>
-                        <a:cs typeface="Arial" panose="020B0604020202020204" pitchFamily="34" charset="0"/>
-                      </a:rPr>
-                      <m:t> </m:t>
-                    </m:r>
-                    <m:r>
-                      <a:rPr lang="de-DE" sz="2400" i="1">
-                        <a:latin typeface="Cambria Math" panose="02040503050406030204" pitchFamily="18" charset="0"/>
-                        <a:cs typeface="Arial" panose="020B0604020202020204" pitchFamily="34" charset="0"/>
-                      </a:rPr>
-                      <m:t>×</m:t>
-                    </m:r>
-                    <m:r>
-                      <a:rPr lang="de-DE" sz="2400" b="0" i="1" smtClean="0">
-                        <a:latin typeface="Cambria Math" panose="02040503050406030204" pitchFamily="18" charset="0"/>
-                        <a:cs typeface="Arial" panose="020B0604020202020204" pitchFamily="34" charset="0"/>
-                      </a:rPr>
-                      <m:t> </m:t>
-                    </m:r>
-                    <m:r>
-                      <a:rPr lang="de-DE" sz="2400" b="0" i="1" smtClean="0">
-                        <a:latin typeface="Cambria Math" panose="02040503050406030204" pitchFamily="18" charset="0"/>
-                        <a:cs typeface="Arial" panose="020B0604020202020204" pitchFamily="34" charset="0"/>
-                      </a:rPr>
-                      <m:t>𝑚𝑎𝑟𝑟𝑖𝑒𝑑</m:t>
-                    </m:r>
-                  </m:oMath>
-                </a14:m>
-                <a:endParaRPr lang="en-US" sz="2400" i="1" dirty="0">
-                  <a:latin typeface="Arial" panose="020B0604020202020204" pitchFamily="34" charset="0"/>
-                  <a:cs typeface="Arial" panose="020B0604020202020204" pitchFamily="34" charset="0"/>
-                </a:endParaRPr>
-              </a:p>
               <a:p>
                 <a:pPr marL="342900" indent="-342900">
                   <a:buFont typeface="Arial" panose="020B0604020202020204" pitchFamily="34" charset="0"/>
@@ -8751,6 +9148,69 @@
                     <a:latin typeface="Arial" panose="020B0604020202020204" pitchFamily="34" charset="0"/>
                     <a:cs typeface="Arial" panose="020B0604020202020204" pitchFamily="34" charset="0"/>
                   </a:rPr>
+                  <a:t>Stepwise </a:t>
+                </a:r>
+                <a:r>
+                  <a:rPr lang="de-DE" sz="2400" dirty="0">
+                    <a:latin typeface="Arial" panose="020B0604020202020204" pitchFamily="34" charset="0"/>
+                    <a:cs typeface="Arial" panose="020B0604020202020204" pitchFamily="34" charset="0"/>
+                  </a:rPr>
+                  <a:t>+ </a:t>
+                </a:r>
+                <a14:m>
+                  <m:oMath xmlns:m="http://schemas.openxmlformats.org/officeDocument/2006/math">
+                    <m:r>
+                      <a:rPr lang="de-DE" sz="2400" i="1">
+                        <a:latin typeface="Cambria Math" panose="02040503050406030204" pitchFamily="18" charset="0"/>
+                        <a:cs typeface="Arial" panose="020B0604020202020204" pitchFamily="34" charset="0"/>
+                      </a:rPr>
+                      <m:t>𝑡𝑟𝑒𝑎𝑡</m:t>
+                    </m:r>
+                    <m:r>
+                      <a:rPr lang="de-DE" sz="2400" i="1">
+                        <a:latin typeface="Cambria Math" panose="02040503050406030204" pitchFamily="18" charset="0"/>
+                        <a:cs typeface="Arial" panose="020B0604020202020204" pitchFamily="34" charset="0"/>
+                      </a:rPr>
+                      <m:t> </m:t>
+                    </m:r>
+                    <m:r>
+                      <a:rPr lang="de-DE" sz="2400" i="1">
+                        <a:latin typeface="Cambria Math" panose="02040503050406030204" pitchFamily="18" charset="0"/>
+                        <a:cs typeface="Arial" panose="020B0604020202020204" pitchFamily="34" charset="0"/>
+                      </a:rPr>
+                      <m:t>×</m:t>
+                    </m:r>
+                    <m:r>
+                      <a:rPr lang="de-DE" sz="2400" i="1">
+                        <a:latin typeface="Cambria Math" panose="02040503050406030204" pitchFamily="18" charset="0"/>
+                        <a:cs typeface="Arial" panose="020B0604020202020204" pitchFamily="34" charset="0"/>
+                      </a:rPr>
+                      <m:t> </m:t>
+                    </m:r>
+                    <m:r>
+                      <a:rPr lang="de-DE" sz="2400" i="1">
+                        <a:latin typeface="Cambria Math" panose="02040503050406030204" pitchFamily="18" charset="0"/>
+                        <a:cs typeface="Arial" panose="020B0604020202020204" pitchFamily="34" charset="0"/>
+                      </a:rPr>
+                      <m:t>𝑚𝑎𝑟𝑟𝑖𝑒𝑑</m:t>
+                    </m:r>
+                  </m:oMath>
+                </a14:m>
+                <a:endParaRPr lang="en-US" sz="2400" dirty="0">
+                  <a:latin typeface="Arial" panose="020B0604020202020204" pitchFamily="34" charset="0"/>
+                  <a:cs typeface="Arial" panose="020B0604020202020204" pitchFamily="34" charset="0"/>
+                </a:endParaRPr>
+              </a:p>
+              <a:p>
+                <a:pPr marL="342900" indent="-342900">
+                  <a:buFont typeface="Arial" panose="020B0604020202020204" pitchFamily="34" charset="0"/>
+                  <a:buChar char="•"/>
+                </a:pPr>
+                <a:r>
+                  <a:rPr lang="en-US" sz="2400" dirty="0">
+                    <a:latin typeface="Arial" panose="020B0604020202020204" pitchFamily="34" charset="0"/>
+                    <a:cs typeface="Arial" panose="020B0604020202020204" pitchFamily="34" charset="0"/>
+                  </a:rPr>
                   <a:t>Stepwise</a:t>
                 </a:r>
                 <a:r>
@@ -8785,7 +9245,7 @@
                     </m:r>
                   </m:oMath>
                 </a14:m>
-                <a:endParaRPr lang="en-US" sz="2400" i="1" dirty="0">
+                <a:endParaRPr lang="de-DE" sz="2400" dirty="0">
                   <a:latin typeface="Arial" panose="020B0604020202020204" pitchFamily="34" charset="0"/>
                   <a:cs typeface="Arial" panose="020B0604020202020204" pitchFamily="34" charset="0"/>
                 </a:endParaRPr>
@@ -8817,7 +9277,7 @@
                 <a:avLst/>
               </a:prstGeom>
               <a:blipFill>
-                <a:blip r:embed="rId4"/>
+                <a:blip r:embed="rId5"/>
                 <a:stretch>
                   <a:fillRect l="-2607" t="-6838" b="-11111"/>
                 </a:stretch>
@@ -8936,7 +9396,7 @@
             <p:nvPr/>
           </p:nvPicPr>
           <p:blipFill>
-            <a:blip r:embed="rId5"/>
+            <a:blip r:embed="rId6"/>
             <a:stretch>
               <a:fillRect/>
             </a:stretch>
@@ -8951,8 +9411,8 @@
             </a:prstGeom>
           </p:spPr>
         </p:pic>
-        <mc:AlternateContent xmlns:mc="http://schemas.openxmlformats.org/markup-compatibility/2006">
-          <mc:Choice xmlns:a14="http://schemas.microsoft.com/office/drawing/2010/main" Requires="a14">
+        <mc:AlternateContent xmlns:mc="http://schemas.openxmlformats.org/markup-compatibility/2006" xmlns:a14="http://schemas.microsoft.com/office/drawing/2010/main">
+          <mc:Choice Requires="a14">
             <p:sp>
               <p:nvSpPr>
                 <p:cNvPr id="11" name="TextBox 10">
@@ -9039,7 +9499,7 @@
               </p:txBody>
             </p:sp>
           </mc:Choice>
-          <mc:Fallback>
+          <mc:Fallback xmlns="">
             <p:sp>
               <p:nvSpPr>
                 <p:cNvPr id="11" name="TextBox 10">
@@ -9063,7 +9523,7 @@
                   <a:avLst/>
                 </a:prstGeom>
                 <a:blipFill>
-                  <a:blip r:embed="rId6"/>
+                  <a:blip r:embed="rId7"/>
                   <a:stretch>
                     <a:fillRect l="-4217" t="-30769" r="-3012" b="-61538"/>
                   </a:stretch>
@@ -9191,6 +9651,48 @@
           </p:style>
         </p:cxnSp>
       </p:grpSp>
+      <p:cxnSp>
+        <p:nvCxnSpPr>
+          <p:cNvPr id="13" name="Straight Arrow Connector 12">
+            <a:extLst>
+              <a:ext uri="{FF2B5EF4-FFF2-40B4-BE49-F238E27FC236}">
+                <a16:creationId xmlns:a16="http://schemas.microsoft.com/office/drawing/2014/main" id="{B338FAE7-6044-3944-BDDF-7D8CC78B0088}"/>
+              </a:ext>
+            </a:extLst>
+          </p:cNvPr>
+          <p:cNvCxnSpPr/>
+          <p:nvPr/>
+        </p:nvCxnSpPr>
+        <p:spPr>
+          <a:xfrm>
+            <a:off x="3287688" y="3220370"/>
+            <a:ext cx="0" cy="496662"/>
+          </a:xfrm>
+          <a:prstGeom prst="straightConnector1">
+            <a:avLst/>
+          </a:prstGeom>
+          <a:ln w="28575">
+            <a:solidFill>
+              <a:schemeClr val="tx1"/>
+            </a:solidFill>
+            <a:tailEnd type="triangle"/>
+          </a:ln>
+        </p:spPr>
+        <p:style>
+          <a:lnRef idx="1">
+            <a:schemeClr val="accent1"/>
+          </a:lnRef>
+          <a:fillRef idx="0">
+            <a:schemeClr val="accent1"/>
+          </a:fillRef>
+          <a:effectRef idx="0">
+            <a:schemeClr val="accent1"/>
+          </a:effectRef>
+          <a:fontRef idx="minor">
+            <a:schemeClr val="tx1"/>
+          </a:fontRef>
+        </p:style>
+      </p:cxnSp>
     </p:spTree>
     <p:extLst>
       <p:ext uri="{BB962C8B-B14F-4D97-AF65-F5344CB8AC3E}">
@@ -9547,8 +10049,8 @@
         </p:nvGrpSpPr>
         <p:grpSpPr>
           <a:xfrm>
-            <a:off x="6816080" y="3580226"/>
-            <a:ext cx="4752528" cy="2646463"/>
+            <a:off x="7280268" y="4098512"/>
+            <a:ext cx="4661457" cy="2595750"/>
             <a:chOff x="5879976" y="3818692"/>
             <a:chExt cx="5216707" cy="2802582"/>
           </a:xfrm>
@@ -9568,7 +10070,7 @@
             <p:nvPr/>
           </p:nvPicPr>
           <p:blipFill rotWithShape="1">
-            <a:blip r:embed="rId2"/>
+            <a:blip r:embed="rId3"/>
             <a:srcRect t="18160" r="6327" b="4690"/>
             <a:stretch/>
           </p:blipFill>
@@ -9640,15 +10142,15 @@
           <p:nvPr/>
         </p:nvPicPr>
         <p:blipFill>
-          <a:blip r:embed="rId3"/>
+          <a:blip r:embed="rId4"/>
           <a:stretch>
             <a:fillRect/>
           </a:stretch>
         </p:blipFill>
         <p:spPr>
           <a:xfrm>
-            <a:off x="460713" y="3580226"/>
-            <a:ext cx="4537978" cy="2513342"/>
+            <a:off x="191344" y="4195949"/>
+            <a:ext cx="4432881" cy="2455134"/>
           </a:xfrm>
           <a:prstGeom prst="rect">
             <a:avLst/>
@@ -9661,36 +10163,6 @@
             <a:extLst>
               <a:ext uri="{FF2B5EF4-FFF2-40B4-BE49-F238E27FC236}">
                 <a16:creationId xmlns:a16="http://schemas.microsoft.com/office/drawing/2014/main" id="{5A6D6F91-8026-B847-A225-95BE7BB19BB5}"/>
-              </a:ext>
-            </a:extLst>
-          </p:cNvPr>
-          <p:cNvPicPr>
-            <a:picLocks noChangeAspect="1"/>
-          </p:cNvPicPr>
-          <p:nvPr/>
-        </p:nvPicPr>
-        <p:blipFill>
-          <a:blip r:embed="rId4"/>
-          <a:stretch>
-            <a:fillRect/>
-          </a:stretch>
-        </p:blipFill>
-        <p:spPr>
-          <a:xfrm>
-            <a:off x="460713" y="1066884"/>
-            <a:ext cx="4537978" cy="2513342"/>
-          </a:xfrm>
-          <a:prstGeom prst="rect">
-            <a:avLst/>
-          </a:prstGeom>
-        </p:spPr>
-      </p:pic>
-      <p:pic>
-        <p:nvPicPr>
-          <p:cNvPr id="26" name="Picture 25" descr="Chart, scatter chart&#10;&#10;Description automatically generated">
-            <a:extLst>
-              <a:ext uri="{FF2B5EF4-FFF2-40B4-BE49-F238E27FC236}">
-                <a16:creationId xmlns:a16="http://schemas.microsoft.com/office/drawing/2014/main" id="{405CC8F7-5ADE-324A-B20A-AFF71A9DABF5}"/>
               </a:ext>
             </a:extLst>
           </p:cNvPr>
@@ -9707,14 +10179,44 @@
         </p:blipFill>
         <p:spPr>
           <a:xfrm>
-            <a:off x="6816080" y="1066884"/>
-            <a:ext cx="4537978" cy="2513342"/>
+            <a:off x="191344" y="1682606"/>
+            <a:ext cx="4432881" cy="2455134"/>
           </a:xfrm>
           <a:prstGeom prst="rect">
             <a:avLst/>
           </a:prstGeom>
         </p:spPr>
       </p:pic>
+      <p:pic>
+        <p:nvPicPr>
+          <p:cNvPr id="26" name="Picture 25" descr="Chart, scatter chart&#10;&#10;Description automatically generated">
+            <a:extLst>
+              <a:ext uri="{FF2B5EF4-FFF2-40B4-BE49-F238E27FC236}">
+                <a16:creationId xmlns:a16="http://schemas.microsoft.com/office/drawing/2014/main" id="{405CC8F7-5ADE-324A-B20A-AFF71A9DABF5}"/>
+              </a:ext>
+            </a:extLst>
+          </p:cNvPr>
+          <p:cNvPicPr>
+            <a:picLocks noChangeAspect="1"/>
+          </p:cNvPicPr>
+          <p:nvPr/>
+        </p:nvPicPr>
+        <p:blipFill>
+          <a:blip r:embed="rId6"/>
+          <a:stretch>
+            <a:fillRect/>
+          </a:stretch>
+        </p:blipFill>
+        <p:spPr>
+          <a:xfrm>
+            <a:off x="7280268" y="1588496"/>
+            <a:ext cx="4451019" cy="2465180"/>
+          </a:xfrm>
+          <a:prstGeom prst="rect">
+            <a:avLst/>
+          </a:prstGeom>
+        </p:spPr>
+      </p:pic>
       <p:sp>
         <p:nvSpPr>
           <p:cNvPr id="27" name="Rectangle 26">
@@ -9729,8 +10231,8 @@
         </p:nvSpPr>
         <p:spPr>
           <a:xfrm>
-            <a:off x="3647369" y="6149753"/>
-            <a:ext cx="4897263" cy="365125"/>
+            <a:off x="4934745" y="2708920"/>
+            <a:ext cx="2160279" cy="2304256"/>
           </a:xfrm>
           <a:prstGeom prst="rect">
             <a:avLst/>
@@ -9773,11 +10275,460 @@
                 <a:latin typeface="Arial" panose="020B0604020202020204" pitchFamily="34" charset="0"/>
                 <a:cs typeface="Arial" panose="020B0604020202020204" pitchFamily="34" charset="0"/>
               </a:rPr>
-              <a:t>No major assumption violations</a:t>
-            </a:r>
-          </a:p>
-        </p:txBody>
-      </p:sp>
+              <a:t>No major assumption violations </a:t>
+            </a:r>
+          </a:p>
+          <a:p>
+            <a:pPr algn="ctr"/>
+            <a:r>
+              <a:rPr lang="en-US" sz="2000" dirty="0">
+                <a:solidFill>
+                  <a:schemeClr val="tx1"/>
+                </a:solidFill>
+                <a:latin typeface="Arial" panose="020B0604020202020204" pitchFamily="34" charset="0"/>
+                <a:cs typeface="Arial" panose="020B0604020202020204" pitchFamily="34" charset="0"/>
+              </a:rPr>
+              <a:t>+ </a:t>
+            </a:r>
+          </a:p>
+          <a:p>
+            <a:pPr algn="ctr"/>
+            <a:r>
+              <a:rPr lang="en-US" sz="2000" dirty="0">
+                <a:solidFill>
+                  <a:schemeClr val="tx1"/>
+                </a:solidFill>
+                <a:latin typeface="Arial" panose="020B0604020202020204" pitchFamily="34" charset="0"/>
+                <a:cs typeface="Arial" panose="020B0604020202020204" pitchFamily="34" charset="0"/>
+              </a:rPr>
+              <a:t>no multicollinearity issues (VIF)</a:t>
+            </a:r>
+          </a:p>
+        </p:txBody>
+      </p:sp>
+      <mc:AlternateContent xmlns:mc="http://schemas.openxmlformats.org/markup-compatibility/2006">
+        <mc:Choice xmlns:a14="http://schemas.microsoft.com/office/drawing/2010/main" Requires="a14">
+          <p:sp>
+            <p:nvSpPr>
+              <p:cNvPr id="16" name="TextBox 15">
+                <a:extLst>
+                  <a:ext uri="{FF2B5EF4-FFF2-40B4-BE49-F238E27FC236}">
+                    <a16:creationId xmlns:a16="http://schemas.microsoft.com/office/drawing/2014/main" id="{79D975B1-A147-A743-ADA4-C6A2B827C41F}"/>
+                  </a:ext>
+                </a:extLst>
+              </p:cNvPr>
+              <p:cNvSpPr txBox="1"/>
+              <p:nvPr/>
+            </p:nvSpPr>
+            <p:spPr>
+              <a:xfrm>
+                <a:off x="1894176" y="1051763"/>
+                <a:ext cx="8403647" cy="388889"/>
+              </a:xfrm>
+              <a:prstGeom prst="rect">
+                <a:avLst/>
+              </a:prstGeom>
+              <a:noFill/>
+            </p:spPr>
+            <p:txBody>
+              <a:bodyPr wrap="none" lIns="0" tIns="0" rIns="0" bIns="0" rtlCol="0">
+                <a:spAutoFit/>
+              </a:bodyPr>
+              <a:lstStyle/>
+              <a:p>
+                <a:pPr algn="l"/>
+                <a14:m>
+                  <m:oMathPara xmlns:m="http://schemas.openxmlformats.org/officeDocument/2006/math">
+                    <m:oMathParaPr>
+                      <m:jc m:val="centerGroup"/>
+                    </m:oMathParaPr>
+                    <m:oMath xmlns:m="http://schemas.openxmlformats.org/officeDocument/2006/math">
+                      <m:acc>
+                        <m:accPr>
+                          <m:chr m:val="̂"/>
+                          <m:ctrlPr>
+                            <a:rPr lang="de-DE" sz="2400" b="0" i="1" smtClean="0">
+                              <a:latin typeface="Cambria Math" panose="02040503050406030204" pitchFamily="18" charset="0"/>
+                              <a:cs typeface="Arial" panose="020B0604020202020204" pitchFamily="34" charset="0"/>
+                            </a:rPr>
+                          </m:ctrlPr>
+                        </m:accPr>
+                        <m:e>
+                          <m:r>
+                            <a:rPr lang="de-DE" sz="2400" b="0" i="1" smtClean="0">
+                              <a:latin typeface="Cambria Math" panose="02040503050406030204" pitchFamily="18" charset="0"/>
+                              <a:cs typeface="Arial" panose="020B0604020202020204" pitchFamily="34" charset="0"/>
+                            </a:rPr>
+                            <m:t>𝑦</m:t>
+                          </m:r>
+                        </m:e>
+                      </m:acc>
+                      <m:r>
+                        <a:rPr lang="de-DE" sz="2400" b="0" i="1" smtClean="0">
+                          <a:latin typeface="Cambria Math" panose="02040503050406030204" pitchFamily="18" charset="0"/>
+                          <a:cs typeface="Arial" panose="020B0604020202020204" pitchFamily="34" charset="0"/>
+                        </a:rPr>
+                        <m:t>=</m:t>
+                      </m:r>
+                      <m:acc>
+                        <m:accPr>
+                          <m:chr m:val="̂"/>
+                          <m:ctrlPr>
+                            <a:rPr lang="de-DE" sz="2400" b="0" i="1" smtClean="0">
+                              <a:latin typeface="Cambria Math" panose="02040503050406030204" pitchFamily="18" charset="0"/>
+                              <a:cs typeface="Arial" panose="020B0604020202020204" pitchFamily="34" charset="0"/>
+                            </a:rPr>
+                          </m:ctrlPr>
+                        </m:accPr>
+                        <m:e>
+                          <m:sSub>
+                            <m:sSubPr>
+                              <m:ctrlPr>
+                                <a:rPr lang="de-DE" sz="2400" b="0" i="1" smtClean="0">
+                                  <a:latin typeface="Cambria Math" panose="02040503050406030204" pitchFamily="18" charset="0"/>
+                                  <a:cs typeface="Arial" panose="020B0604020202020204" pitchFamily="34" charset="0"/>
+                                </a:rPr>
+                              </m:ctrlPr>
+                            </m:sSubPr>
+                            <m:e>
+                              <m:r>
+                                <a:rPr lang="de-DE" sz="2400" b="0" i="1" smtClean="0">
+                                  <a:latin typeface="Cambria Math" panose="02040503050406030204" pitchFamily="18" charset="0"/>
+                                  <a:cs typeface="Arial" panose="020B0604020202020204" pitchFamily="34" charset="0"/>
+                                </a:rPr>
+                                <m:t>𝛽</m:t>
+                              </m:r>
+                            </m:e>
+                            <m:sub>
+                              <m:r>
+                                <a:rPr lang="de-DE" sz="2400" b="0" i="1" smtClean="0">
+                                  <a:latin typeface="Cambria Math" panose="02040503050406030204" pitchFamily="18" charset="0"/>
+                                  <a:cs typeface="Arial" panose="020B0604020202020204" pitchFamily="34" charset="0"/>
+                                </a:rPr>
+                                <m:t>0</m:t>
+                              </m:r>
+                            </m:sub>
+                          </m:sSub>
+                        </m:e>
+                      </m:acc>
+                      <m:r>
+                        <a:rPr lang="de-DE" sz="2400" b="0" i="1" smtClean="0">
+                          <a:latin typeface="Cambria Math" panose="02040503050406030204" pitchFamily="18" charset="0"/>
+                          <a:cs typeface="Arial" panose="020B0604020202020204" pitchFamily="34" charset="0"/>
+                        </a:rPr>
+                        <m:t>+</m:t>
+                      </m:r>
+                      <m:acc>
+                        <m:accPr>
+                          <m:chr m:val="̂"/>
+                          <m:ctrlPr>
+                            <a:rPr lang="de-DE" sz="2400" b="0" i="1" smtClean="0">
+                              <a:latin typeface="Cambria Math" panose="02040503050406030204" pitchFamily="18" charset="0"/>
+                              <a:cs typeface="Arial" panose="020B0604020202020204" pitchFamily="34" charset="0"/>
+                            </a:rPr>
+                          </m:ctrlPr>
+                        </m:accPr>
+                        <m:e>
+                          <m:sSub>
+                            <m:sSubPr>
+                              <m:ctrlPr>
+                                <a:rPr lang="de-DE" sz="2400" b="0" i="1" smtClean="0">
+                                  <a:latin typeface="Cambria Math" panose="02040503050406030204" pitchFamily="18" charset="0"/>
+                                  <a:cs typeface="Arial" panose="020B0604020202020204" pitchFamily="34" charset="0"/>
+                                </a:rPr>
+                              </m:ctrlPr>
+                            </m:sSubPr>
+                            <m:e>
+                              <m:r>
+                                <a:rPr lang="de-DE" sz="2400" b="0" i="1" smtClean="0">
+                                  <a:latin typeface="Cambria Math" panose="02040503050406030204" pitchFamily="18" charset="0"/>
+                                  <a:cs typeface="Arial" panose="020B0604020202020204" pitchFamily="34" charset="0"/>
+                                </a:rPr>
+                                <m:t>𝛽</m:t>
+                              </m:r>
+                            </m:e>
+                            <m:sub>
+                              <m:r>
+                                <a:rPr lang="de-DE" sz="2400" b="0" i="1" smtClean="0">
+                                  <a:latin typeface="Cambria Math" panose="02040503050406030204" pitchFamily="18" charset="0"/>
+                                  <a:cs typeface="Arial" panose="020B0604020202020204" pitchFamily="34" charset="0"/>
+                                </a:rPr>
+                                <m:t>1</m:t>
+                              </m:r>
+                            </m:sub>
+                          </m:sSub>
+                        </m:e>
+                      </m:acc>
+                      <m:r>
+                        <a:rPr lang="de-DE" sz="2400" b="0" i="1" smtClean="0">
+                          <a:latin typeface="Cambria Math" panose="02040503050406030204" pitchFamily="18" charset="0"/>
+                          <a:cs typeface="Arial" panose="020B0604020202020204" pitchFamily="34" charset="0"/>
+                        </a:rPr>
+                        <m:t>⋅</m:t>
+                      </m:r>
+                      <m:r>
+                        <a:rPr lang="de-DE" sz="2400" b="0" i="1" smtClean="0">
+                          <a:latin typeface="Cambria Math" panose="02040503050406030204" pitchFamily="18" charset="0"/>
+                          <a:cs typeface="Arial" panose="020B0604020202020204" pitchFamily="34" charset="0"/>
+                        </a:rPr>
+                        <m:t>𝑡𝑟𝑒𝑎𝑡</m:t>
+                      </m:r>
+                      <m:r>
+                        <a:rPr lang="de-DE" sz="2400" b="0" i="1" smtClean="0">
+                          <a:latin typeface="Cambria Math" panose="02040503050406030204" pitchFamily="18" charset="0"/>
+                          <a:cs typeface="Arial" panose="020B0604020202020204" pitchFamily="34" charset="0"/>
+                        </a:rPr>
+                        <m:t>+</m:t>
+                      </m:r>
+                      <m:acc>
+                        <m:accPr>
+                          <m:chr m:val="̂"/>
+                          <m:ctrlPr>
+                            <a:rPr lang="de-DE" sz="2400" b="0" i="1" smtClean="0">
+                              <a:latin typeface="Cambria Math" panose="02040503050406030204" pitchFamily="18" charset="0"/>
+                              <a:cs typeface="Arial" panose="020B0604020202020204" pitchFamily="34" charset="0"/>
+                            </a:rPr>
+                          </m:ctrlPr>
+                        </m:accPr>
+                        <m:e>
+                          <m:sSub>
+                            <m:sSubPr>
+                              <m:ctrlPr>
+                                <a:rPr lang="de-DE" sz="2400" b="0" i="1" smtClean="0">
+                                  <a:latin typeface="Cambria Math" panose="02040503050406030204" pitchFamily="18" charset="0"/>
+                                  <a:cs typeface="Arial" panose="020B0604020202020204" pitchFamily="34" charset="0"/>
+                                </a:rPr>
+                              </m:ctrlPr>
+                            </m:sSubPr>
+                            <m:e>
+                              <m:r>
+                                <a:rPr lang="de-DE" sz="2400" b="0" i="1" smtClean="0">
+                                  <a:latin typeface="Cambria Math" panose="02040503050406030204" pitchFamily="18" charset="0"/>
+                                  <a:cs typeface="Arial" panose="020B0604020202020204" pitchFamily="34" charset="0"/>
+                                </a:rPr>
+                                <m:t>𝛽</m:t>
+                              </m:r>
+                            </m:e>
+                            <m:sub>
+                              <m:r>
+                                <a:rPr lang="de-DE" sz="2400" b="0" i="1" smtClean="0">
+                                  <a:latin typeface="Cambria Math" panose="02040503050406030204" pitchFamily="18" charset="0"/>
+                                  <a:cs typeface="Arial" panose="020B0604020202020204" pitchFamily="34" charset="0"/>
+                                </a:rPr>
+                                <m:t>2</m:t>
+                              </m:r>
+                            </m:sub>
+                          </m:sSub>
+                        </m:e>
+                      </m:acc>
+                      <m:r>
+                        <a:rPr lang="de-DE" sz="2400" b="0" i="1" smtClean="0">
+                          <a:latin typeface="Cambria Math" panose="02040503050406030204" pitchFamily="18" charset="0"/>
+                          <a:cs typeface="Arial" panose="020B0604020202020204" pitchFamily="34" charset="0"/>
+                        </a:rPr>
+                        <m:t>⋅</m:t>
+                      </m:r>
+                      <m:r>
+                        <a:rPr lang="de-DE" sz="2400" b="0" i="1" smtClean="0">
+                          <a:latin typeface="Cambria Math" panose="02040503050406030204" pitchFamily="18" charset="0"/>
+                          <a:cs typeface="Arial" panose="020B0604020202020204" pitchFamily="34" charset="0"/>
+                        </a:rPr>
+                        <m:t>𝑎𝑔𝑒</m:t>
+                      </m:r>
+                      <m:r>
+                        <a:rPr lang="de-DE" sz="2400" b="0" i="1" smtClean="0">
+                          <a:latin typeface="Cambria Math" panose="02040503050406030204" pitchFamily="18" charset="0"/>
+                          <a:cs typeface="Arial" panose="020B0604020202020204" pitchFamily="34" charset="0"/>
+                        </a:rPr>
+                        <m:t>+</m:t>
+                      </m:r>
+                      <m:acc>
+                        <m:accPr>
+                          <m:chr m:val="̂"/>
+                          <m:ctrlPr>
+                            <a:rPr lang="de-DE" sz="2400" b="0" i="1" smtClean="0">
+                              <a:latin typeface="Cambria Math" panose="02040503050406030204" pitchFamily="18" charset="0"/>
+                              <a:cs typeface="Arial" panose="020B0604020202020204" pitchFamily="34" charset="0"/>
+                            </a:rPr>
+                          </m:ctrlPr>
+                        </m:accPr>
+                        <m:e>
+                          <m:sSub>
+                            <m:sSubPr>
+                              <m:ctrlPr>
+                                <a:rPr lang="de-DE" sz="2400" b="0" i="1" smtClean="0">
+                                  <a:latin typeface="Cambria Math" panose="02040503050406030204" pitchFamily="18" charset="0"/>
+                                  <a:cs typeface="Arial" panose="020B0604020202020204" pitchFamily="34" charset="0"/>
+                                </a:rPr>
+                              </m:ctrlPr>
+                            </m:sSubPr>
+                            <m:e>
+                              <m:r>
+                                <a:rPr lang="de-DE" sz="2400" b="0" i="1" smtClean="0">
+                                  <a:latin typeface="Cambria Math" panose="02040503050406030204" pitchFamily="18" charset="0"/>
+                                  <a:cs typeface="Arial" panose="020B0604020202020204" pitchFamily="34" charset="0"/>
+                                </a:rPr>
+                                <m:t>𝛽</m:t>
+                              </m:r>
+                            </m:e>
+                            <m:sub>
+                              <m:r>
+                                <a:rPr lang="de-DE" sz="2400" b="0" i="1" smtClean="0">
+                                  <a:latin typeface="Cambria Math" panose="02040503050406030204" pitchFamily="18" charset="0"/>
+                                  <a:cs typeface="Arial" panose="020B0604020202020204" pitchFamily="34" charset="0"/>
+                                </a:rPr>
+                                <m:t>3</m:t>
+                              </m:r>
+                            </m:sub>
+                          </m:sSub>
+                        </m:e>
+                      </m:acc>
+                      <m:r>
+                        <a:rPr lang="de-DE" sz="2400" b="0" i="1" smtClean="0">
+                          <a:latin typeface="Cambria Math" panose="02040503050406030204" pitchFamily="18" charset="0"/>
+                          <a:cs typeface="Arial" panose="020B0604020202020204" pitchFamily="34" charset="0"/>
+                        </a:rPr>
+                        <m:t>⋅</m:t>
+                      </m:r>
+                      <m:r>
+                        <a:rPr lang="de-DE" sz="2400" b="0" i="1" smtClean="0">
+                          <a:latin typeface="Cambria Math" panose="02040503050406030204" pitchFamily="18" charset="0"/>
+                          <a:cs typeface="Arial" panose="020B0604020202020204" pitchFamily="34" charset="0"/>
+                        </a:rPr>
+                        <m:t>𝑚𝑎𝑟𝑟𝑖𝑒𝑑</m:t>
+                      </m:r>
+                      <m:r>
+                        <a:rPr lang="de-DE" sz="2400" b="0" i="1" smtClean="0">
+                          <a:latin typeface="Cambria Math" panose="02040503050406030204" pitchFamily="18" charset="0"/>
+                          <a:cs typeface="Arial" panose="020B0604020202020204" pitchFamily="34" charset="0"/>
+                        </a:rPr>
+                        <m:t>+</m:t>
+                      </m:r>
+                      <m:acc>
+                        <m:accPr>
+                          <m:chr m:val="̂"/>
+                          <m:ctrlPr>
+                            <a:rPr lang="de-DE" sz="2400" b="0" i="1" smtClean="0">
+                              <a:latin typeface="Cambria Math" panose="02040503050406030204" pitchFamily="18" charset="0"/>
+                              <a:cs typeface="Arial" panose="020B0604020202020204" pitchFamily="34" charset="0"/>
+                            </a:rPr>
+                          </m:ctrlPr>
+                        </m:accPr>
+                        <m:e>
+                          <m:sSub>
+                            <m:sSubPr>
+                              <m:ctrlPr>
+                                <a:rPr lang="de-DE" sz="2400" b="0" i="1" smtClean="0">
+                                  <a:latin typeface="Cambria Math" panose="02040503050406030204" pitchFamily="18" charset="0"/>
+                                  <a:cs typeface="Arial" panose="020B0604020202020204" pitchFamily="34" charset="0"/>
+                                </a:rPr>
+                              </m:ctrlPr>
+                            </m:sSubPr>
+                            <m:e>
+                              <m:r>
+                                <a:rPr lang="de-DE" sz="2400" b="0" i="1" smtClean="0">
+                                  <a:latin typeface="Cambria Math" panose="02040503050406030204" pitchFamily="18" charset="0"/>
+                                  <a:cs typeface="Arial" panose="020B0604020202020204" pitchFamily="34" charset="0"/>
+                                </a:rPr>
+                                <m:t>𝛽</m:t>
+                              </m:r>
+                            </m:e>
+                            <m:sub>
+                              <m:r>
+                                <a:rPr lang="de-DE" sz="2400" b="0" i="1" smtClean="0">
+                                  <a:latin typeface="Cambria Math" panose="02040503050406030204" pitchFamily="18" charset="0"/>
+                                  <a:cs typeface="Arial" panose="020B0604020202020204" pitchFamily="34" charset="0"/>
+                                </a:rPr>
+                                <m:t>4</m:t>
+                              </m:r>
+                            </m:sub>
+                          </m:sSub>
+                        </m:e>
+                      </m:acc>
+                      <m:r>
+                        <a:rPr lang="de-DE" sz="2400" b="0" i="1" smtClean="0">
+                          <a:latin typeface="Cambria Math" panose="02040503050406030204" pitchFamily="18" charset="0"/>
+                          <a:cs typeface="Arial" panose="020B0604020202020204" pitchFamily="34" charset="0"/>
+                        </a:rPr>
+                        <m:t>⋅</m:t>
+                      </m:r>
+                      <m:r>
+                        <a:rPr lang="de-DE" sz="2400" b="0" i="1" smtClean="0">
+                          <a:latin typeface="Cambria Math" panose="02040503050406030204" pitchFamily="18" charset="0"/>
+                          <a:cs typeface="Arial" panose="020B0604020202020204" pitchFamily="34" charset="0"/>
+                        </a:rPr>
+                        <m:t>𝑡𝑟𝑒𝑎𝑡</m:t>
+                      </m:r>
+                      <m:r>
+                        <a:rPr lang="de-DE" sz="2400" b="0" i="1" smtClean="0">
+                          <a:latin typeface="Cambria Math" panose="02040503050406030204" pitchFamily="18" charset="0"/>
+                          <a:cs typeface="Arial" panose="020B0604020202020204" pitchFamily="34" charset="0"/>
+                        </a:rPr>
+                        <m:t>×</m:t>
+                      </m:r>
+                      <m:r>
+                        <a:rPr lang="de-DE" sz="2400" b="0" i="1" smtClean="0">
+                          <a:latin typeface="Cambria Math" panose="02040503050406030204" pitchFamily="18" charset="0"/>
+                          <a:cs typeface="Arial" panose="020B0604020202020204" pitchFamily="34" charset="0"/>
+                        </a:rPr>
+                        <m:t>𝑎𝑔𝑒</m:t>
+                      </m:r>
+                    </m:oMath>
+                  </m:oMathPara>
+                </a14:m>
+                <a:endParaRPr lang="en-US" sz="2400" dirty="0">
+                  <a:latin typeface="Arial" panose="020B0604020202020204" pitchFamily="34" charset="0"/>
+                  <a:cs typeface="Arial" panose="020B0604020202020204" pitchFamily="34" charset="0"/>
+                </a:endParaRPr>
+              </a:p>
+            </p:txBody>
+          </p:sp>
+        </mc:Choice>
+        <mc:Fallback>
+          <p:sp>
+            <p:nvSpPr>
+              <p:cNvPr id="16" name="TextBox 15">
+                <a:extLst>
+                  <a:ext uri="{FF2B5EF4-FFF2-40B4-BE49-F238E27FC236}">
+                    <a16:creationId xmlns:a16="http://schemas.microsoft.com/office/drawing/2014/main" id="{79D975B1-A147-A743-ADA4-C6A2B827C41F}"/>
+                  </a:ext>
+                </a:extLst>
+              </p:cNvPr>
+              <p:cNvSpPr txBox="1">
+                <a:spLocks noRot="1" noChangeAspect="1" noMove="1" noResize="1" noEditPoints="1" noAdjustHandles="1" noChangeArrowheads="1" noChangeShapeType="1" noTextEdit="1"/>
+              </p:cNvSpPr>
+              <p:nvPr/>
+            </p:nvSpPr>
+            <p:spPr>
+              <a:xfrm>
+                <a:off x="1894176" y="1051763"/>
+                <a:ext cx="8403647" cy="388889"/>
+              </a:xfrm>
+              <a:prstGeom prst="rect">
+                <a:avLst/>
+              </a:prstGeom>
+              <a:blipFill>
+                <a:blip r:embed="rId7"/>
+                <a:stretch>
+                  <a:fillRect l="-302" t="-22581" r="-302" b="-32258"/>
+                </a:stretch>
+              </a:blipFill>
+            </p:spPr>
+            <p:txBody>
+              <a:bodyPr/>
+              <a:lstStyle/>
+              <a:p>
+                <a:r>
+                  <a:rPr lang="en-US">
+                    <a:noFill/>
+                  </a:rPr>
+                  <a:t> </a:t>
+                </a:r>
+              </a:p>
+            </p:txBody>
+          </p:sp>
+        </mc:Fallback>
+      </mc:AlternateContent>
     </p:spTree>
     <p:extLst>
       <p:ext uri="{BB962C8B-B14F-4D97-AF65-F5344CB8AC3E}">
@@ -9933,36 +10884,6 @@
           <p:nvPr/>
         </p:nvPicPr>
         <p:blipFill>
-          <a:blip r:embed="rId2"/>
-          <a:stretch>
-            <a:fillRect/>
-          </a:stretch>
-        </p:blipFill>
-        <p:spPr>
-          <a:xfrm>
-            <a:off x="5556607" y="1124744"/>
-            <a:ext cx="6174680" cy="1882009"/>
-          </a:xfrm>
-          <a:prstGeom prst="rect">
-            <a:avLst/>
-          </a:prstGeom>
-        </p:spPr>
-      </p:pic>
-      <p:pic>
-        <p:nvPicPr>
-          <p:cNvPr id="10" name="Picture 9" descr="Chart, line chart&#10;&#10;Description automatically generated">
-            <a:extLst>
-              <a:ext uri="{FF2B5EF4-FFF2-40B4-BE49-F238E27FC236}">
-                <a16:creationId xmlns:a16="http://schemas.microsoft.com/office/drawing/2014/main" id="{1FB34245-67B5-EF48-8ABD-5C3CE9425A98}"/>
-              </a:ext>
-            </a:extLst>
-          </p:cNvPr>
-          <p:cNvPicPr>
-            <a:picLocks noChangeAspect="1"/>
-          </p:cNvPicPr>
-          <p:nvPr/>
-        </p:nvPicPr>
-        <p:blipFill>
           <a:blip r:embed="rId3"/>
           <a:stretch>
             <a:fillRect/>
@@ -9970,8 +10891,225 @@
         </p:blipFill>
         <p:spPr>
           <a:xfrm>
-            <a:off x="5556607" y="3092938"/>
-            <a:ext cx="5743290" cy="3445974"/>
+            <a:off x="453964" y="1670899"/>
+            <a:ext cx="5235832" cy="1595853"/>
+          </a:xfrm>
+          <a:prstGeom prst="rect">
+            <a:avLst/>
+          </a:prstGeom>
+        </p:spPr>
+      </p:pic>
+      <p:sp>
+        <p:nvSpPr>
+          <p:cNvPr id="6" name="TextBox 5">
+            <a:extLst>
+              <a:ext uri="{FF2B5EF4-FFF2-40B4-BE49-F238E27FC236}">
+                <a16:creationId xmlns:a16="http://schemas.microsoft.com/office/drawing/2014/main" id="{C23CDA49-30B5-F746-AD13-FAD403AE75BE}"/>
+              </a:ext>
+            </a:extLst>
+          </p:cNvPr>
+          <p:cNvSpPr txBox="1"/>
+          <p:nvPr/>
+        </p:nvSpPr>
+        <p:spPr>
+          <a:xfrm>
+            <a:off x="7078991" y="5753559"/>
+            <a:ext cx="4526111" cy="369332"/>
+          </a:xfrm>
+          <a:prstGeom prst="rect">
+            <a:avLst/>
+          </a:prstGeom>
+          <a:noFill/>
+        </p:spPr>
+        <p:txBody>
+          <a:bodyPr wrap="none" lIns="0" tIns="0" rIns="0" bIns="0" rtlCol="0">
+            <a:spAutoFit/>
+          </a:bodyPr>
+          <a:lstStyle/>
+          <a:p>
+            <a:pPr algn="l"/>
+            <a:r>
+              <a:rPr lang="en-US" sz="2400" dirty="0">
+                <a:latin typeface="Arial" panose="020B0604020202020204" pitchFamily="34" charset="0"/>
+                <a:cs typeface="Arial" panose="020B0604020202020204" pitchFamily="34" charset="0"/>
+              </a:rPr>
+              <a:t>TODO: CI for all vars in </a:t>
+            </a:r>
+            <a:r>
+              <a:rPr lang="en-US" sz="2400" dirty="0" err="1">
+                <a:latin typeface="Arial" panose="020B0604020202020204" pitchFamily="34" charset="0"/>
+                <a:cs typeface="Arial" panose="020B0604020202020204" pitchFamily="34" charset="0"/>
+              </a:rPr>
+              <a:t>sep</a:t>
+            </a:r>
+            <a:r>
+              <a:rPr lang="en-US" sz="2400" dirty="0">
+                <a:latin typeface="Arial" panose="020B0604020202020204" pitchFamily="34" charset="0"/>
+                <a:cs typeface="Arial" panose="020B0604020202020204" pitchFamily="34" charset="0"/>
+              </a:rPr>
+              <a:t> table</a:t>
+            </a:r>
+          </a:p>
+        </p:txBody>
+      </p:sp>
+      <p:sp>
+        <p:nvSpPr>
+          <p:cNvPr id="7" name="TextBox 6">
+            <a:extLst>
+              <a:ext uri="{FF2B5EF4-FFF2-40B4-BE49-F238E27FC236}">
+                <a16:creationId xmlns:a16="http://schemas.microsoft.com/office/drawing/2014/main" id="{88ED2B36-EF4D-9A40-BF95-82096A4715C4}"/>
+              </a:ext>
+            </a:extLst>
+          </p:cNvPr>
+          <p:cNvSpPr txBox="1"/>
+          <p:nvPr/>
+        </p:nvSpPr>
+        <p:spPr>
+          <a:xfrm>
+            <a:off x="7104112" y="4221088"/>
+            <a:ext cx="1473160" cy="738664"/>
+          </a:xfrm>
+          <a:prstGeom prst="rect">
+            <a:avLst/>
+          </a:prstGeom>
+          <a:noFill/>
+        </p:spPr>
+        <p:txBody>
+          <a:bodyPr wrap="none" lIns="0" tIns="0" rIns="0" bIns="0" rtlCol="0">
+            <a:spAutoFit/>
+          </a:bodyPr>
+          <a:lstStyle/>
+          <a:p>
+            <a:pPr algn="l"/>
+            <a:r>
+              <a:rPr lang="en-US" sz="2400" dirty="0">
+                <a:latin typeface="Arial" panose="020B0604020202020204" pitchFamily="34" charset="0"/>
+                <a:cs typeface="Arial" panose="020B0604020202020204" pitchFamily="34" charset="0"/>
+              </a:rPr>
+              <a:t>Limitations</a:t>
+            </a:r>
+          </a:p>
+          <a:p>
+            <a:pPr algn="l"/>
+            <a:r>
+              <a:rPr lang="en-US" sz="2400" dirty="0">
+                <a:latin typeface="Arial" panose="020B0604020202020204" pitchFamily="34" charset="0"/>
+                <a:cs typeface="Arial" panose="020B0604020202020204" pitchFamily="34" charset="0"/>
+              </a:rPr>
+              <a:t>- Low R2</a:t>
+            </a:r>
+          </a:p>
+        </p:txBody>
+      </p:sp>
+      <p:sp>
+        <p:nvSpPr>
+          <p:cNvPr id="9" name="TextBox 8">
+            <a:extLst>
+              <a:ext uri="{FF2B5EF4-FFF2-40B4-BE49-F238E27FC236}">
+                <a16:creationId xmlns:a16="http://schemas.microsoft.com/office/drawing/2014/main" id="{5864DE45-F31F-F34E-BAC6-E015E30D4D60}"/>
+              </a:ext>
+            </a:extLst>
+          </p:cNvPr>
+          <p:cNvSpPr txBox="1"/>
+          <p:nvPr/>
+        </p:nvSpPr>
+        <p:spPr>
+          <a:xfrm>
+            <a:off x="460713" y="1147906"/>
+            <a:ext cx="888064" cy="369332"/>
+          </a:xfrm>
+          <a:prstGeom prst="rect">
+            <a:avLst/>
+          </a:prstGeom>
+          <a:noFill/>
+        </p:spPr>
+        <p:txBody>
+          <a:bodyPr wrap="none" lIns="0" tIns="0" rIns="0" bIns="0" rtlCol="0">
+            <a:spAutoFit/>
+          </a:bodyPr>
+          <a:lstStyle/>
+          <a:p>
+            <a:pPr algn="l"/>
+            <a:r>
+              <a:rPr lang="en-US" sz="2400" b="1" dirty="0">
+                <a:solidFill>
+                  <a:srgbClr val="03529B"/>
+                </a:solidFill>
+                <a:latin typeface="Arial" panose="020B0604020202020204" pitchFamily="34" charset="0"/>
+                <a:cs typeface="Arial" panose="020B0604020202020204" pitchFamily="34" charset="0"/>
+              </a:rPr>
+              <a:t>Model</a:t>
+            </a:r>
+          </a:p>
+        </p:txBody>
+      </p:sp>
+      <p:cxnSp>
+        <p:nvCxnSpPr>
+          <p:cNvPr id="11" name="Straight Connector 10">
+            <a:extLst>
+              <a:ext uri="{FF2B5EF4-FFF2-40B4-BE49-F238E27FC236}">
+                <a16:creationId xmlns:a16="http://schemas.microsoft.com/office/drawing/2014/main" id="{F45F55A1-178F-204B-8122-0D25726930AE}"/>
+              </a:ext>
+            </a:extLst>
+          </p:cNvPr>
+          <p:cNvCxnSpPr>
+            <a:cxnSpLocks/>
+          </p:cNvCxnSpPr>
+          <p:nvPr/>
+        </p:nvCxnSpPr>
+        <p:spPr>
+          <a:xfrm>
+            <a:off x="460713" y="1520934"/>
+            <a:ext cx="5209425" cy="0"/>
+          </a:xfrm>
+          <a:prstGeom prst="line">
+            <a:avLst/>
+          </a:prstGeom>
+          <a:ln w="28575">
+            <a:solidFill>
+              <a:srgbClr val="03529B"/>
+            </a:solidFill>
+          </a:ln>
+        </p:spPr>
+        <p:style>
+          <a:lnRef idx="1">
+            <a:schemeClr val="accent1"/>
+          </a:lnRef>
+          <a:fillRef idx="0">
+            <a:schemeClr val="accent1"/>
+          </a:fillRef>
+          <a:effectRef idx="0">
+            <a:schemeClr val="accent1"/>
+          </a:effectRef>
+          <a:fontRef idx="minor">
+            <a:schemeClr val="tx1"/>
+          </a:fontRef>
+        </p:style>
+      </p:cxnSp>
+      <p:pic>
+        <p:nvPicPr>
+          <p:cNvPr id="12" name="Picture 11" descr="Chart, line chart&#10;&#10;Description automatically generated">
+            <a:extLst>
+              <a:ext uri="{FF2B5EF4-FFF2-40B4-BE49-F238E27FC236}">
+                <a16:creationId xmlns:a16="http://schemas.microsoft.com/office/drawing/2014/main" id="{1230B900-9738-584F-8D23-FB718BC7087A}"/>
+              </a:ext>
+            </a:extLst>
+          </p:cNvPr>
+          <p:cNvPicPr>
+            <a:picLocks noChangeAspect="1"/>
+          </p:cNvPicPr>
+          <p:nvPr/>
+        </p:nvPicPr>
+        <p:blipFill>
+          <a:blip r:embed="rId4"/>
+          <a:stretch>
+            <a:fillRect/>
+          </a:stretch>
+        </p:blipFill>
+        <p:spPr>
+          <a:xfrm>
+            <a:off x="184448" y="3333794"/>
+            <a:ext cx="5623516" cy="3374110"/>
           </a:xfrm>
           <a:prstGeom prst="rect">
             <a:avLst/>

</xml_diff>